<commit_message>
Add random number sample, fix unnecessary NuGet references
</commit_message>
<xml_diff>
--- a/Slides/Secure-Coding-Dot-Net.pptx
+++ b/Slides/Secure-Coding-Dot-Net.pptx
@@ -5,19 +5,21 @@
     <p:sldMasterId id="2147483648" r:id="rId4"/>
   </p:sldMasterIdLst>
   <p:notesMasterIdLst>
-    <p:notesMasterId r:id="rId12"/>
+    <p:notesMasterId r:id="rId14"/>
   </p:notesMasterIdLst>
   <p:handoutMasterIdLst>
-    <p:handoutMasterId r:id="rId13"/>
+    <p:handoutMasterId r:id="rId15"/>
   </p:handoutMasterIdLst>
   <p:sldIdLst>
     <p:sldId id="377" r:id="rId5"/>
     <p:sldId id="378" r:id="rId6"/>
     <p:sldId id="379" r:id="rId7"/>
     <p:sldId id="380" r:id="rId8"/>
-    <p:sldId id="382" r:id="rId9"/>
-    <p:sldId id="381" r:id="rId10"/>
-    <p:sldId id="362" r:id="rId11"/>
+    <p:sldId id="383" r:id="rId9"/>
+    <p:sldId id="382" r:id="rId10"/>
+    <p:sldId id="381" r:id="rId11"/>
+    <p:sldId id="384" r:id="rId12"/>
+    <p:sldId id="362" r:id="rId13"/>
   </p:sldIdLst>
   <p:sldSz cx="9144000" cy="5143500" type="screen16x9"/>
   <p:notesSz cx="6858000" cy="9144000"/>
@@ -231,7 +233,7 @@
           <a:p>
             <a:fld id="{D3FDC4BA-F62C-46A2-87C1-2103180CFF88}" type="datetimeFigureOut">
               <a:rPr lang="de-AT" smtClean="0"/>
-              <a:t>19.06.2019</a:t>
+              <a:t>21.06.2019</a:t>
             </a:fld>
             <a:endParaRPr lang="de-AT"/>
           </a:p>
@@ -397,7 +399,7 @@
             <a:fld id="{3612A09C-9A01-4873-9E29-1DA9CA5B5B01}" type="datetimeFigureOut">
               <a:rPr lang="de-DE" smtClean="0"/>
               <a:pPr/>
-              <a:t>19.06.2019</a:t>
+              <a:t>21.06.2019</a:t>
             </a:fld>
             <a:endParaRPr lang="de-AT"/>
           </a:p>
@@ -12709,6 +12711,175 @@
           <p:cNvPr id="2" name="Title 1">
             <a:extLst>
               <a:ext uri="{FF2B5EF4-FFF2-40B4-BE49-F238E27FC236}">
+                <a16:creationId xmlns:a16="http://schemas.microsoft.com/office/drawing/2014/main" id="{FDCA5176-74BF-4D0C-AC1E-AD64ADD2C686}"/>
+              </a:ext>
+            </a:extLst>
+          </p:cNvPr>
+          <p:cNvSpPr>
+            <a:spLocks noGrp="1"/>
+          </p:cNvSpPr>
+          <p:nvPr>
+            <p:ph type="title"/>
+          </p:nvPr>
+        </p:nvSpPr>
+        <p:spPr/>
+        <p:txBody>
+          <a:bodyPr/>
+          <a:lstStyle/>
+          <a:p>
+            <a:r>
+              <a:rPr lang="en-US"/>
+              <a:t>bcrypt.net</a:t>
+            </a:r>
+          </a:p>
+        </p:txBody>
+      </p:sp>
+      <p:sp>
+        <p:nvSpPr>
+          <p:cNvPr id="3" name="Content Placeholder 2">
+            <a:extLst>
+              <a:ext uri="{FF2B5EF4-FFF2-40B4-BE49-F238E27FC236}">
+                <a16:creationId xmlns:a16="http://schemas.microsoft.com/office/drawing/2014/main" id="{C9EC6411-B607-40FF-9D56-8B7F02BAFF0B}"/>
+              </a:ext>
+            </a:extLst>
+          </p:cNvPr>
+          <p:cNvSpPr>
+            <a:spLocks noGrp="1"/>
+          </p:cNvSpPr>
+          <p:nvPr>
+            <p:ph sz="quarter" idx="12"/>
+          </p:nvPr>
+        </p:nvSpPr>
+        <p:spPr/>
+        <p:txBody>
+          <a:bodyPr/>
+          <a:lstStyle/>
+          <a:p>
+            <a:r>
+              <a:rPr lang="en-US">
+                <a:hlinkClick r:id="rId2"/>
+              </a:rPr>
+              <a:t>https://github.com/BcryptNet/bcrypt.net</a:t>
+            </a:r>
+            <a:endParaRPr lang="en-US"/>
+          </a:p>
+          <a:p>
+            <a:pPr lvl="1"/>
+            <a:r>
+              <a:rPr lang="en-US"/>
+              <a:t>NuGet: </a:t>
+            </a:r>
+            <a:r>
+              <a:rPr lang="en-US" i="1"/>
+              <a:t>BCrypt.Net-Next</a:t>
+            </a:r>
+          </a:p>
+          <a:p>
+            <a:r>
+              <a:rPr lang="en-US"/>
+              <a:t>Port of </a:t>
+            </a:r>
+            <a:r>
+              <a:rPr lang="en-US" i="1"/>
+              <a:t>jBCrypt</a:t>
+            </a:r>
+            <a:r>
+              <a:rPr lang="en-US"/>
+              <a:t> to C#</a:t>
+            </a:r>
+          </a:p>
+          <a:p>
+            <a:pPr lvl="1"/>
+            <a:r>
+              <a:rPr lang="en-US"/>
+              <a:t>Used to safely store passwords</a:t>
+            </a:r>
+          </a:p>
+          <a:p>
+            <a:r>
+              <a:rPr lang="en-US"/>
+              <a:t>Hashing of passwords with configurable hash complexity</a:t>
+            </a:r>
+          </a:p>
+          <a:p>
+            <a:pPr lvl="1"/>
+            <a:r>
+              <a:rPr lang="en-US"/>
+              <a:t>Compute power necessary for hashing can be set („work factor“)</a:t>
+            </a:r>
+          </a:p>
+          <a:p>
+            <a:pPr lvl="1"/>
+            <a:r>
+              <a:rPr lang="en-US"/>
+              <a:t>Backward/forward compatible because complexity part of resultant hash</a:t>
+            </a:r>
+          </a:p>
+        </p:txBody>
+      </p:sp>
+      <p:sp>
+        <p:nvSpPr>
+          <p:cNvPr id="4" name="Text Placeholder 3">
+            <a:extLst>
+              <a:ext uri="{FF2B5EF4-FFF2-40B4-BE49-F238E27FC236}">
+                <a16:creationId xmlns:a16="http://schemas.microsoft.com/office/drawing/2014/main" id="{BEB509E2-1834-430D-8807-974A525128EE}"/>
+              </a:ext>
+            </a:extLst>
+          </p:cNvPr>
+          <p:cNvSpPr>
+            <a:spLocks noGrp="1"/>
+          </p:cNvSpPr>
+          <p:nvPr>
+            <p:ph type="body" sz="quarter" idx="23"/>
+          </p:nvPr>
+        </p:nvSpPr>
+        <p:spPr/>
+        <p:txBody>
+          <a:bodyPr/>
+          <a:lstStyle/>
+          <a:p>
+            <a:endParaRPr lang="en-US"/>
+          </a:p>
+        </p:txBody>
+      </p:sp>
+    </p:spTree>
+    <p:extLst>
+      <p:ext uri="{BB962C8B-B14F-4D97-AF65-F5344CB8AC3E}">
+        <p14:creationId xmlns:p14="http://schemas.microsoft.com/office/powerpoint/2010/main" val="789896913"/>
+      </p:ext>
+    </p:extLst>
+  </p:cSld>
+  <p:clrMapOvr>
+    <a:masterClrMapping/>
+  </p:clrMapOvr>
+  <p:transition spd="slow">
+    <p:push/>
+  </p:transition>
+</p:sld>
+</file>
+
+<file path=ppt/slides/slide6.xml><?xml version="1.0" encoding="utf-8"?>
+<p:sld xmlns:a="http://schemas.openxmlformats.org/drawingml/2006/main" xmlns:r="http://schemas.openxmlformats.org/officeDocument/2006/relationships" xmlns:p="http://schemas.openxmlformats.org/presentationml/2006/main">
+  <p:cSld>
+    <p:spTree>
+      <p:nvGrpSpPr>
+        <p:cNvPr id="1" name=""/>
+        <p:cNvGrpSpPr/>
+        <p:nvPr/>
+      </p:nvGrpSpPr>
+      <p:grpSpPr>
+        <a:xfrm>
+          <a:off x="0" y="0"/>
+          <a:ext cx="0" cy="0"/>
+          <a:chOff x="0" y="0"/>
+          <a:chExt cx="0" cy="0"/>
+        </a:xfrm>
+      </p:grpSpPr>
+      <p:sp>
+        <p:nvSpPr>
+          <p:cNvPr id="2" name="Title 1">
+            <a:extLst>
+              <a:ext uri="{FF2B5EF4-FFF2-40B4-BE49-F238E27FC236}">
                 <a16:creationId xmlns:a16="http://schemas.microsoft.com/office/drawing/2014/main" id="{64A1225C-D095-4E0E-815F-A53B73B18B79}"/>
               </a:ext>
             </a:extLst>
@@ -12837,7 +13008,7 @@
 </p:sld>
 </file>
 
-<file path=ppt/slides/slide6.xml><?xml version="1.0" encoding="utf-8"?>
+<file path=ppt/slides/slide7.xml><?xml version="1.0" encoding="utf-8"?>
 <p:sld xmlns:a="http://schemas.openxmlformats.org/drawingml/2006/main" xmlns:r="http://schemas.openxmlformats.org/officeDocument/2006/relationships" xmlns:p="http://schemas.openxmlformats.org/presentationml/2006/main">
   <p:cSld>
     <p:spTree>
@@ -13002,7 +13173,133 @@
 </p:sld>
 </file>
 
-<file path=ppt/slides/slide7.xml><?xml version="1.0" encoding="utf-8"?>
+<file path=ppt/slides/slide8.xml><?xml version="1.0" encoding="utf-8"?>
+<p:sld xmlns:a="http://schemas.openxmlformats.org/drawingml/2006/main" xmlns:r="http://schemas.openxmlformats.org/officeDocument/2006/relationships" xmlns:p="http://schemas.openxmlformats.org/presentationml/2006/main">
+  <p:cSld>
+    <p:spTree>
+      <p:nvGrpSpPr>
+        <p:cNvPr id="1" name=""/>
+        <p:cNvGrpSpPr/>
+        <p:nvPr/>
+      </p:nvGrpSpPr>
+      <p:grpSpPr>
+        <a:xfrm>
+          <a:off x="0" y="0"/>
+          <a:ext cx="0" cy="0"/>
+          <a:chOff x="0" y="0"/>
+          <a:chExt cx="0" cy="0"/>
+        </a:xfrm>
+      </p:grpSpPr>
+      <p:sp>
+        <p:nvSpPr>
+          <p:cNvPr id="2" name="Title 1">
+            <a:extLst>
+              <a:ext uri="{FF2B5EF4-FFF2-40B4-BE49-F238E27FC236}">
+                <a16:creationId xmlns:a16="http://schemas.microsoft.com/office/drawing/2014/main" id="{2572AE16-A283-4B2F-B9A5-A97D08773560}"/>
+              </a:ext>
+            </a:extLst>
+          </p:cNvPr>
+          <p:cNvSpPr>
+            <a:spLocks noGrp="1"/>
+          </p:cNvSpPr>
+          <p:nvPr>
+            <p:ph type="title"/>
+          </p:nvPr>
+        </p:nvSpPr>
+        <p:spPr/>
+        <p:txBody>
+          <a:bodyPr/>
+          <a:lstStyle/>
+          <a:p>
+            <a:r>
+              <a:rPr lang="en-US"/>
+              <a:t>Examples</a:t>
+            </a:r>
+          </a:p>
+        </p:txBody>
+      </p:sp>
+      <p:sp>
+        <p:nvSpPr>
+          <p:cNvPr id="3" name="Content Placeholder 2">
+            <a:extLst>
+              <a:ext uri="{FF2B5EF4-FFF2-40B4-BE49-F238E27FC236}">
+                <a16:creationId xmlns:a16="http://schemas.microsoft.com/office/drawing/2014/main" id="{189993DB-6F02-4D83-9680-D34AEF0E7BB5}"/>
+              </a:ext>
+            </a:extLst>
+          </p:cNvPr>
+          <p:cNvSpPr>
+            <a:spLocks noGrp="1"/>
+          </p:cNvSpPr>
+          <p:nvPr>
+            <p:ph sz="quarter" idx="12"/>
+          </p:nvPr>
+        </p:nvSpPr>
+        <p:spPr/>
+        <p:txBody>
+          <a:bodyPr/>
+          <a:lstStyle/>
+          <a:p>
+            <a:r>
+              <a:rPr lang="en-US" dirty="0"/>
+              <a:t>06-BCrypt</a:t>
+            </a:r>
+          </a:p>
+          <a:p>
+            <a:pPr lvl="1"/>
+            <a:r>
+              <a:rPr lang="en-US" dirty="0"/>
+              <a:t>Hash passwords with </a:t>
+            </a:r>
+            <a:r>
+              <a:rPr lang="en-US" i="1" dirty="0" err="1"/>
+              <a:t>BCrypt</a:t>
+            </a:r>
+            <a:endParaRPr lang="en-US" i="1" dirty="0"/>
+          </a:p>
+        </p:txBody>
+      </p:sp>
+      <p:sp>
+        <p:nvSpPr>
+          <p:cNvPr id="4" name="Text Placeholder 3">
+            <a:extLst>
+              <a:ext uri="{FF2B5EF4-FFF2-40B4-BE49-F238E27FC236}">
+                <a16:creationId xmlns:a16="http://schemas.microsoft.com/office/drawing/2014/main" id="{0B3F959B-5A8B-4040-981A-0EBAC93AE572}"/>
+              </a:ext>
+            </a:extLst>
+          </p:cNvPr>
+          <p:cNvSpPr>
+            <a:spLocks noGrp="1"/>
+          </p:cNvSpPr>
+          <p:nvPr>
+            <p:ph type="body" sz="quarter" idx="23"/>
+          </p:nvPr>
+        </p:nvSpPr>
+        <p:spPr/>
+        <p:txBody>
+          <a:bodyPr/>
+          <a:lstStyle/>
+          <a:p>
+            <a:endParaRPr lang="en-US"/>
+          </a:p>
+        </p:txBody>
+      </p:sp>
+    </p:spTree>
+    <p:extLst>
+      <p:ext uri="{BB962C8B-B14F-4D97-AF65-F5344CB8AC3E}">
+        <p14:creationId xmlns:p14="http://schemas.microsoft.com/office/powerpoint/2010/main" val="1295082866"/>
+      </p:ext>
+    </p:extLst>
+  </p:cSld>
+  <p:clrMapOvr>
+    <a:masterClrMapping/>
+  </p:clrMapOvr>
+  <p:transition spd="slow">
+    <p:push/>
+  </p:transition>
+</p:sld>
+</file>
+
+<file path=ppt/slides/slide9.xml><?xml version="1.0" encoding="utf-8"?>
 <p:sld xmlns:a="http://schemas.openxmlformats.org/drawingml/2006/main" xmlns:r="http://schemas.openxmlformats.org/officeDocument/2006/relationships" xmlns:p="http://schemas.openxmlformats.org/presentationml/2006/main">
   <p:cSld>
     <p:spTree>
@@ -14062,21 +14359,6 @@
 </file>
 
 <file path=customXml/item1.xml><?xml version="1.0" encoding="utf-8"?>
-<p:properties xmlns:p="http://schemas.microsoft.com/office/2006/metadata/properties" xmlns:xsi="http://www.w3.org/2001/XMLSchema-instance">
-  <documentManagement/>
-</p:properties>
-</file>
-
-<file path=customXml/item2.xml><?xml version="1.0" encoding="utf-8"?>
-<?mso-contentType ?>
-<FormTemplates xmlns="http://schemas.microsoft.com/sharepoint/v3/contenttype/forms">
-  <Display>DocumentLibraryForm</Display>
-  <Edit>DocumentLibraryForm</Edit>
-  <New>DocumentLibraryForm</New>
-</FormTemplates>
-</file>
-
-<file path=customXml/item3.xml><?xml version="1.0" encoding="utf-8"?>
 <ct:contentTypeSchema xmlns:ct="http://schemas.microsoft.com/office/2006/metadata/contentType" xmlns:ma="http://schemas.microsoft.com/office/2006/metadata/properties/metaAttributes" ct:_="" ma:_="" ma:contentTypeName="Document" ma:contentTypeID="0x0101006C90029AD581154692170791F90B0BA6" ma:contentTypeVersion="0" ma:contentTypeDescription="Create a new document." ma:contentTypeScope="" ma:versionID="453f2a28f59e13bb333d4563bd7e6ec5">
   <xsd:schema xmlns:xsd="http://www.w3.org/2001/XMLSchema" xmlns:p="http://schemas.microsoft.com/office/2006/metadata/properties" targetNamespace="http://schemas.microsoft.com/office/2006/metadata/properties" ma:root="true" ma:fieldsID="4aeb20c0e3442673af7ee10786458764">
     <xsd:element name="properties">
@@ -14125,16 +14407,32 @@
 </ct:contentTypeSchema>
 </file>
 
+<file path=customXml/item2.xml><?xml version="1.0" encoding="utf-8"?>
+<?mso-contentType ?>
+<FormTemplates xmlns="http://schemas.microsoft.com/sharepoint/v3/contenttype/forms">
+  <Display>DocumentLibraryForm</Display>
+  <Edit>DocumentLibraryForm</Edit>
+  <New>DocumentLibraryForm</New>
+</FormTemplates>
+</file>
+
+<file path=customXml/item3.xml><?xml version="1.0" encoding="utf-8"?>
+<p:properties xmlns:p="http://schemas.microsoft.com/office/2006/metadata/properties" xmlns:xsi="http://www.w3.org/2001/XMLSchema-instance">
+  <documentManagement/>
+</p:properties>
+</file>
+
 <file path=customXml/itemProps1.xml><?xml version="1.0" encoding="utf-8"?>
-<ds:datastoreItem xmlns:ds="http://schemas.openxmlformats.org/officeDocument/2006/customXml" ds:itemID="{03D43D4A-F5F8-47F6-A4EC-521F433C91BF}">
+<ds:datastoreItem xmlns:ds="http://schemas.openxmlformats.org/officeDocument/2006/customXml" ds:itemID="{14A11C81-3A20-458B-AC33-D8C9DB9BBB4A}">
   <ds:schemaRefs>
+    <ds:schemaRef ds:uri="http://schemas.microsoft.com/office/2006/metadata/contentType"/>
+    <ds:schemaRef ds:uri="http://schemas.microsoft.com/office/2006/metadata/properties/metaAttributes"/>
+    <ds:schemaRef ds:uri="http://www.w3.org/2001/XMLSchema"/>
     <ds:schemaRef ds:uri="http://schemas.microsoft.com/office/2006/metadata/properties"/>
+    <ds:schemaRef ds:uri="http://schemas.openxmlformats.org/package/2006/metadata/core-properties"/>
+    <ds:schemaRef ds:uri="http://purl.org/dc/elements/1.1/"/>
     <ds:schemaRef ds:uri="http://purl.org/dc/terms/"/>
-    <ds:schemaRef ds:uri="http://schemas.openxmlformats.org/package/2006/metadata/core-properties"/>
-    <ds:schemaRef ds:uri="http://schemas.microsoft.com/office/2006/documentManagement/types"/>
-    <ds:schemaRef ds:uri="http://purl.org/dc/elements/1.1/"/>
-    <ds:schemaRef ds:uri="http://www.w3.org/XML/1998/namespace"/>
-    <ds:schemaRef ds:uri="http://purl.org/dc/dcmitype/"/>
+    <ds:schemaRef ds:uri="http://schemas.microsoft.com/office/internal/2005/internalDocumentation"/>
   </ds:schemaRefs>
 </ds:datastoreItem>
 </file>
@@ -14148,16 +14446,15 @@
 </file>
 
 <file path=customXml/itemProps3.xml><?xml version="1.0" encoding="utf-8"?>
-<ds:datastoreItem xmlns:ds="http://schemas.openxmlformats.org/officeDocument/2006/customXml" ds:itemID="{14A11C81-3A20-458B-AC33-D8C9DB9BBB4A}">
+<ds:datastoreItem xmlns:ds="http://schemas.openxmlformats.org/officeDocument/2006/customXml" ds:itemID="{03D43D4A-F5F8-47F6-A4EC-521F433C91BF}">
   <ds:schemaRefs>
-    <ds:schemaRef ds:uri="http://schemas.microsoft.com/office/2006/metadata/contentType"/>
-    <ds:schemaRef ds:uri="http://schemas.microsoft.com/office/2006/metadata/properties/metaAttributes"/>
-    <ds:schemaRef ds:uri="http://www.w3.org/2001/XMLSchema"/>
     <ds:schemaRef ds:uri="http://schemas.microsoft.com/office/2006/metadata/properties"/>
+    <ds:schemaRef ds:uri="http://purl.org/dc/terms/"/>
     <ds:schemaRef ds:uri="http://schemas.openxmlformats.org/package/2006/metadata/core-properties"/>
+    <ds:schemaRef ds:uri="http://schemas.microsoft.com/office/2006/documentManagement/types"/>
     <ds:schemaRef ds:uri="http://purl.org/dc/elements/1.1/"/>
-    <ds:schemaRef ds:uri="http://purl.org/dc/terms/"/>
-    <ds:schemaRef ds:uri="http://schemas.microsoft.com/office/internal/2005/internalDocumentation"/>
+    <ds:schemaRef ds:uri="http://www.w3.org/XML/1998/namespace"/>
+    <ds:schemaRef ds:uri="http://purl.org/dc/dcmitype/"/>
   </ds:schemaRefs>
 </ds:datastoreItem>
 </file>
</xml_diff>

<commit_message>
Add additional examples, extend slide deck
</commit_message>
<xml_diff>
--- a/Slides/Secure-Coding-Dot-Net.pptx
+++ b/Slides/Secure-Coding-Dot-Net.pptx
@@ -5,21 +5,28 @@
     <p:sldMasterId id="2147483648" r:id="rId4"/>
   </p:sldMasterIdLst>
   <p:notesMasterIdLst>
-    <p:notesMasterId r:id="rId14"/>
+    <p:notesMasterId r:id="rId21"/>
   </p:notesMasterIdLst>
   <p:handoutMasterIdLst>
-    <p:handoutMasterId r:id="rId15"/>
+    <p:handoutMasterId r:id="rId22"/>
   </p:handoutMasterIdLst>
   <p:sldIdLst>
     <p:sldId id="377" r:id="rId5"/>
-    <p:sldId id="378" r:id="rId6"/>
-    <p:sldId id="379" r:id="rId7"/>
-    <p:sldId id="380" r:id="rId8"/>
-    <p:sldId id="383" r:id="rId9"/>
-    <p:sldId id="382" r:id="rId10"/>
-    <p:sldId id="381" r:id="rId11"/>
-    <p:sldId id="384" r:id="rId12"/>
-    <p:sldId id="362" r:id="rId13"/>
+    <p:sldId id="390" r:id="rId6"/>
+    <p:sldId id="391" r:id="rId7"/>
+    <p:sldId id="378" r:id="rId8"/>
+    <p:sldId id="379" r:id="rId9"/>
+    <p:sldId id="380" r:id="rId10"/>
+    <p:sldId id="385" r:id="rId11"/>
+    <p:sldId id="383" r:id="rId12"/>
+    <p:sldId id="381" r:id="rId13"/>
+    <p:sldId id="384" r:id="rId14"/>
+    <p:sldId id="386" r:id="rId15"/>
+    <p:sldId id="387" r:id="rId16"/>
+    <p:sldId id="389" r:id="rId17"/>
+    <p:sldId id="392" r:id="rId18"/>
+    <p:sldId id="393" r:id="rId19"/>
+    <p:sldId id="362" r:id="rId20"/>
   </p:sldIdLst>
   <p:sldSz cx="9144000" cy="5143500" type="screen16x9"/>
   <p:notesSz cx="6858000" cy="9144000"/>
@@ -233,7 +240,7 @@
           <a:p>
             <a:fld id="{D3FDC4BA-F62C-46A2-87C1-2103180CFF88}" type="datetimeFigureOut">
               <a:rPr lang="de-AT" smtClean="0"/>
-              <a:t>21.06.2019</a:t>
+              <a:t>24.06.2019</a:t>
             </a:fld>
             <a:endParaRPr lang="de-AT"/>
           </a:p>
@@ -399,7 +406,7 @@
             <a:fld id="{3612A09C-9A01-4873-9E29-1DA9CA5B5B01}" type="datetimeFigureOut">
               <a:rPr lang="de-DE" smtClean="0"/>
               <a:pPr/>
-              <a:t>21.06.2019</a:t>
+              <a:t>24.06.2019</a:t>
             </a:fld>
             <a:endParaRPr lang="de-AT"/>
           </a:p>
@@ -12008,6 +12015,1332 @@
 </p:sld>
 </file>
 
+<file path=ppt/slides/slide10.xml><?xml version="1.0" encoding="utf-8"?>
+<p:sld xmlns:a="http://schemas.openxmlformats.org/drawingml/2006/main" xmlns:r="http://schemas.openxmlformats.org/officeDocument/2006/relationships" xmlns:p="http://schemas.openxmlformats.org/presentationml/2006/main">
+  <p:cSld>
+    <p:spTree>
+      <p:nvGrpSpPr>
+        <p:cNvPr id="1" name=""/>
+        <p:cNvGrpSpPr/>
+        <p:nvPr/>
+      </p:nvGrpSpPr>
+      <p:grpSpPr>
+        <a:xfrm>
+          <a:off x="0" y="0"/>
+          <a:ext cx="0" cy="0"/>
+          <a:chOff x="0" y="0"/>
+          <a:chExt cx="0" cy="0"/>
+        </a:xfrm>
+      </p:grpSpPr>
+      <p:sp>
+        <p:nvSpPr>
+          <p:cNvPr id="2" name="Title 1">
+            <a:extLst>
+              <a:ext uri="{FF2B5EF4-FFF2-40B4-BE49-F238E27FC236}">
+                <a16:creationId xmlns:a16="http://schemas.microsoft.com/office/drawing/2014/main" id="{2572AE16-A283-4B2F-B9A5-A97D08773560}"/>
+              </a:ext>
+            </a:extLst>
+          </p:cNvPr>
+          <p:cNvSpPr>
+            <a:spLocks noGrp="1"/>
+          </p:cNvSpPr>
+          <p:nvPr>
+            <p:ph type="title"/>
+          </p:nvPr>
+        </p:nvSpPr>
+        <p:spPr/>
+        <p:txBody>
+          <a:bodyPr/>
+          <a:lstStyle/>
+          <a:p>
+            <a:r>
+              <a:rPr lang="en-US"/>
+              <a:t>Examples</a:t>
+            </a:r>
+          </a:p>
+        </p:txBody>
+      </p:sp>
+      <p:sp>
+        <p:nvSpPr>
+          <p:cNvPr id="3" name="Content Placeholder 2">
+            <a:extLst>
+              <a:ext uri="{FF2B5EF4-FFF2-40B4-BE49-F238E27FC236}">
+                <a16:creationId xmlns:a16="http://schemas.microsoft.com/office/drawing/2014/main" id="{189993DB-6F02-4D83-9680-D34AEF0E7BB5}"/>
+              </a:ext>
+            </a:extLst>
+          </p:cNvPr>
+          <p:cNvSpPr>
+            <a:spLocks noGrp="1"/>
+          </p:cNvSpPr>
+          <p:nvPr>
+            <p:ph sz="quarter" idx="12"/>
+          </p:nvPr>
+        </p:nvSpPr>
+        <p:spPr/>
+        <p:txBody>
+          <a:bodyPr/>
+          <a:lstStyle/>
+          <a:p>
+            <a:r>
+              <a:rPr lang="en-US" dirty="0"/>
+              <a:t>05-RandomNumbers</a:t>
+            </a:r>
+          </a:p>
+          <a:p>
+            <a:pPr lvl="1"/>
+            <a:r>
+              <a:rPr lang="en-US" dirty="0"/>
+              <a:t>Generating strong random numbers with </a:t>
+            </a:r>
+            <a:r>
+              <a:rPr lang="en-US" i="1" dirty="0" err="1"/>
+              <a:t>RNGCryptoServiceProvider</a:t>
+            </a:r>
+            <a:endParaRPr lang="en-US" i="1" dirty="0"/>
+          </a:p>
+          <a:p>
+            <a:r>
+              <a:rPr lang="en-US" dirty="0"/>
+              <a:t>06-BCrypt</a:t>
+            </a:r>
+          </a:p>
+          <a:p>
+            <a:pPr lvl="1"/>
+            <a:r>
+              <a:rPr lang="en-US" dirty="0"/>
+              <a:t>Hash passwords with </a:t>
+            </a:r>
+            <a:r>
+              <a:rPr lang="en-US" i="1" dirty="0" err="1"/>
+              <a:t>BCrypt</a:t>
+            </a:r>
+            <a:endParaRPr lang="en-US" i="1" dirty="0"/>
+          </a:p>
+        </p:txBody>
+      </p:sp>
+      <p:sp>
+        <p:nvSpPr>
+          <p:cNvPr id="4" name="Text Placeholder 3">
+            <a:extLst>
+              <a:ext uri="{FF2B5EF4-FFF2-40B4-BE49-F238E27FC236}">
+                <a16:creationId xmlns:a16="http://schemas.microsoft.com/office/drawing/2014/main" id="{0B3F959B-5A8B-4040-981A-0EBAC93AE572}"/>
+              </a:ext>
+            </a:extLst>
+          </p:cNvPr>
+          <p:cNvSpPr>
+            <a:spLocks noGrp="1"/>
+          </p:cNvSpPr>
+          <p:nvPr>
+            <p:ph type="body" sz="quarter" idx="23"/>
+          </p:nvPr>
+        </p:nvSpPr>
+        <p:spPr/>
+        <p:txBody>
+          <a:bodyPr/>
+          <a:lstStyle/>
+          <a:p>
+            <a:endParaRPr lang="en-US"/>
+          </a:p>
+        </p:txBody>
+      </p:sp>
+    </p:spTree>
+    <p:extLst>
+      <p:ext uri="{BB962C8B-B14F-4D97-AF65-F5344CB8AC3E}">
+        <p14:creationId xmlns:p14="http://schemas.microsoft.com/office/powerpoint/2010/main" val="1295082866"/>
+      </p:ext>
+    </p:extLst>
+  </p:cSld>
+  <p:clrMapOvr>
+    <a:masterClrMapping/>
+  </p:clrMapOvr>
+  <p:transition spd="slow">
+    <p:push/>
+  </p:transition>
+</p:sld>
+</file>
+
+<file path=ppt/slides/slide11.xml><?xml version="1.0" encoding="utf-8"?>
+<p:sld xmlns:a="http://schemas.openxmlformats.org/drawingml/2006/main" xmlns:r="http://schemas.openxmlformats.org/officeDocument/2006/relationships" xmlns:p="http://schemas.openxmlformats.org/presentationml/2006/main">
+  <p:cSld>
+    <p:spTree>
+      <p:nvGrpSpPr>
+        <p:cNvPr id="1" name=""/>
+        <p:cNvGrpSpPr/>
+        <p:nvPr/>
+      </p:nvGrpSpPr>
+      <p:grpSpPr>
+        <a:xfrm>
+          <a:off x="0" y="0"/>
+          <a:ext cx="0" cy="0"/>
+          <a:chOff x="0" y="0"/>
+          <a:chExt cx="0" cy="0"/>
+        </a:xfrm>
+      </p:grpSpPr>
+      <p:sp>
+        <p:nvSpPr>
+          <p:cNvPr id="2" name="Title 1">
+            <a:extLst>
+              <a:ext uri="{FF2B5EF4-FFF2-40B4-BE49-F238E27FC236}">
+                <a16:creationId xmlns:a16="http://schemas.microsoft.com/office/drawing/2014/main" id="{F8FADD9F-D779-4FB6-A392-8DDB9F3A789C}"/>
+              </a:ext>
+            </a:extLst>
+          </p:cNvPr>
+          <p:cNvSpPr>
+            <a:spLocks noGrp="1"/>
+          </p:cNvSpPr>
+          <p:nvPr>
+            <p:ph type="title"/>
+          </p:nvPr>
+        </p:nvSpPr>
+        <p:spPr/>
+        <p:txBody>
+          <a:bodyPr/>
+          <a:lstStyle/>
+          <a:p>
+            <a:r>
+              <a:rPr lang="de-AT" dirty="0" err="1"/>
+              <a:t>Protecting</a:t>
+            </a:r>
+            <a:r>
+              <a:rPr lang="de-AT" dirty="0"/>
+              <a:t> Secrets</a:t>
+            </a:r>
+          </a:p>
+        </p:txBody>
+      </p:sp>
+      <p:sp>
+        <p:nvSpPr>
+          <p:cNvPr id="3" name="Text Placeholder 2">
+            <a:extLst>
+              <a:ext uri="{FF2B5EF4-FFF2-40B4-BE49-F238E27FC236}">
+                <a16:creationId xmlns:a16="http://schemas.microsoft.com/office/drawing/2014/main" id="{72858DEE-163D-402F-981D-E182F9F8632E}"/>
+              </a:ext>
+            </a:extLst>
+          </p:cNvPr>
+          <p:cNvSpPr>
+            <a:spLocks noGrp="1"/>
+          </p:cNvSpPr>
+          <p:nvPr>
+            <p:ph type="body" sz="quarter" idx="25"/>
+          </p:nvPr>
+        </p:nvSpPr>
+        <p:spPr/>
+        <p:txBody>
+          <a:bodyPr/>
+          <a:lstStyle/>
+          <a:p>
+            <a:r>
+              <a:rPr lang="en-US" dirty="0"/>
+              <a:t>How to protect connection information</a:t>
+            </a:r>
+            <a:endParaRPr lang="de-AT" dirty="0"/>
+          </a:p>
+        </p:txBody>
+      </p:sp>
+    </p:spTree>
+    <p:extLst>
+      <p:ext uri="{BB962C8B-B14F-4D97-AF65-F5344CB8AC3E}">
+        <p14:creationId xmlns:p14="http://schemas.microsoft.com/office/powerpoint/2010/main" val="2423346125"/>
+      </p:ext>
+    </p:extLst>
+  </p:cSld>
+  <p:clrMapOvr>
+    <a:masterClrMapping/>
+  </p:clrMapOvr>
+  <mc:AlternateContent xmlns:mc="http://schemas.openxmlformats.org/markup-compatibility/2006" xmlns:p14="http://schemas.microsoft.com/office/powerpoint/2010/main">
+    <mc:Choice Requires="p14">
+      <p:transition spd="med" p14:dur="700">
+        <p:fade/>
+      </p:transition>
+    </mc:Choice>
+    <mc:Fallback xmlns="">
+      <p:transition spd="med">
+        <p:fade/>
+      </p:transition>
+    </mc:Fallback>
+  </mc:AlternateContent>
+</p:sld>
+</file>
+
+<file path=ppt/slides/slide12.xml><?xml version="1.0" encoding="utf-8"?>
+<p:sld xmlns:a="http://schemas.openxmlformats.org/drawingml/2006/main" xmlns:r="http://schemas.openxmlformats.org/officeDocument/2006/relationships" xmlns:p="http://schemas.openxmlformats.org/presentationml/2006/main">
+  <p:cSld>
+    <p:spTree>
+      <p:nvGrpSpPr>
+        <p:cNvPr id="1" name=""/>
+        <p:cNvGrpSpPr/>
+        <p:nvPr/>
+      </p:nvGrpSpPr>
+      <p:grpSpPr>
+        <a:xfrm>
+          <a:off x="0" y="0"/>
+          <a:ext cx="0" cy="0"/>
+          <a:chOff x="0" y="0"/>
+          <a:chExt cx="0" cy="0"/>
+        </a:xfrm>
+      </p:grpSpPr>
+      <p:sp>
+        <p:nvSpPr>
+          <p:cNvPr id="4" name="Title 3">
+            <a:extLst>
+              <a:ext uri="{FF2B5EF4-FFF2-40B4-BE49-F238E27FC236}">
+                <a16:creationId xmlns:a16="http://schemas.microsoft.com/office/drawing/2014/main" id="{BDD3605E-FD53-466F-BE4A-2E05F5F4F85D}"/>
+              </a:ext>
+            </a:extLst>
+          </p:cNvPr>
+          <p:cNvSpPr>
+            <a:spLocks noGrp="1"/>
+          </p:cNvSpPr>
+          <p:nvPr>
+            <p:ph type="title"/>
+          </p:nvPr>
+        </p:nvSpPr>
+        <p:spPr/>
+        <p:txBody>
+          <a:bodyPr/>
+          <a:lstStyle/>
+          <a:p>
+            <a:r>
+              <a:rPr lang="en-US"/>
+              <a:t>General Guidelines</a:t>
+            </a:r>
+          </a:p>
+        </p:txBody>
+      </p:sp>
+      <p:sp>
+        <p:nvSpPr>
+          <p:cNvPr id="5" name="Content Placeholder 4">
+            <a:extLst>
+              <a:ext uri="{FF2B5EF4-FFF2-40B4-BE49-F238E27FC236}">
+                <a16:creationId xmlns:a16="http://schemas.microsoft.com/office/drawing/2014/main" id="{01F131BF-9B34-48AC-BA46-B6209F9C8653}"/>
+              </a:ext>
+            </a:extLst>
+          </p:cNvPr>
+          <p:cNvSpPr>
+            <a:spLocks noGrp="1"/>
+          </p:cNvSpPr>
+          <p:nvPr>
+            <p:ph sz="quarter" idx="12"/>
+          </p:nvPr>
+        </p:nvSpPr>
+        <p:spPr/>
+        <p:txBody>
+          <a:bodyPr/>
+          <a:lstStyle/>
+          <a:p>
+            <a:r>
+              <a:rPr lang="en-US" dirty="0"/>
+              <a:t>Prefer not storing secrets at all</a:t>
+            </a:r>
+          </a:p>
+          <a:p>
+            <a:pPr lvl="1"/>
+            <a:r>
+              <a:rPr lang="en-US" dirty="0"/>
+              <a:t>Windows Authentication</a:t>
+            </a:r>
+          </a:p>
+          <a:p>
+            <a:pPr lvl="1"/>
+            <a:r>
+              <a:rPr lang="en-US" dirty="0"/>
+              <a:t>Azure: Use AAD authentication with SQL (</a:t>
+            </a:r>
+            <a:r>
+              <a:rPr lang="en-US" dirty="0">
+                <a:hlinkClick r:id="rId2"/>
+              </a:rPr>
+              <a:t>docs</a:t>
+            </a:r>
+            <a:r>
+              <a:rPr lang="en-US" dirty="0"/>
+              <a:t>)</a:t>
+            </a:r>
+          </a:p>
+          <a:p>
+            <a:pPr lvl="1"/>
+            <a:r>
+              <a:rPr lang="en-US" dirty="0"/>
+              <a:t>Azure Managed Identities (</a:t>
+            </a:r>
+            <a:r>
+              <a:rPr lang="en-US" dirty="0">
+                <a:hlinkClick r:id="rId3"/>
+              </a:rPr>
+              <a:t>docs</a:t>
+            </a:r>
+            <a:r>
+              <a:rPr lang="en-US" dirty="0"/>
+              <a:t>)</a:t>
+            </a:r>
+          </a:p>
+          <a:p>
+            <a:r>
+              <a:rPr lang="en-US" dirty="0"/>
+              <a:t>Use </a:t>
+            </a:r>
+            <a:r>
+              <a:rPr lang="en-US" dirty="0">
+                <a:hlinkClick r:id="rId4"/>
+              </a:rPr>
+              <a:t>Connection String Builders</a:t>
+            </a:r>
+            <a:r>
+              <a:rPr lang="en-US" dirty="0"/>
+              <a:t> instead of string </a:t>
+            </a:r>
+            <a:r>
+              <a:rPr lang="en-US" dirty="0" err="1"/>
+              <a:t>concat</a:t>
+            </a:r>
+            <a:endParaRPr lang="en-US" dirty="0"/>
+          </a:p>
+          <a:p>
+            <a:pPr lvl="1"/>
+            <a:r>
+              <a:rPr lang="en-US" dirty="0"/>
+              <a:t>Sample: </a:t>
+            </a:r>
+            <a:r>
+              <a:rPr lang="en-US" i="1" dirty="0"/>
+              <a:t>07-ConnectionStringBuilders</a:t>
+            </a:r>
+            <a:endParaRPr lang="en-US" dirty="0"/>
+          </a:p>
+          <a:p>
+            <a:pPr lvl="1"/>
+            <a:r>
+              <a:rPr lang="en-US" u="sng" dirty="0"/>
+              <a:t>Don’t</a:t>
+            </a:r>
+            <a:r>
+              <a:rPr lang="en-US" dirty="0"/>
+              <a:t> set </a:t>
+            </a:r>
+            <a:r>
+              <a:rPr lang="en-US" i="1" dirty="0"/>
+              <a:t>Persist Security Info=True</a:t>
+            </a:r>
+            <a:r>
+              <a:rPr lang="en-US" dirty="0"/>
+              <a:t> (default is False) to prevent security-sensitive information to be obtained from a connection</a:t>
+            </a:r>
+          </a:p>
+          <a:p>
+            <a:r>
+              <a:rPr lang="en-US" i="1" dirty="0"/>
+              <a:t>private/protected/internal</a:t>
+            </a:r>
+            <a:r>
+              <a:rPr lang="en-US" dirty="0"/>
+              <a:t> is </a:t>
+            </a:r>
+            <a:r>
+              <a:rPr lang="en-US" u="sng" dirty="0"/>
+              <a:t>no</a:t>
+            </a:r>
+            <a:r>
+              <a:rPr lang="en-US" dirty="0"/>
+              <a:t> protection</a:t>
+            </a:r>
+          </a:p>
+          <a:p>
+            <a:pPr lvl="1"/>
+            <a:r>
+              <a:rPr lang="en-US" dirty="0"/>
+              <a:t>See also </a:t>
+            </a:r>
+            <a:r>
+              <a:rPr lang="en-US" i="1" dirty="0" err="1"/>
+              <a:t>BindingFlags.NonPublic</a:t>
+            </a:r>
+            <a:r>
+              <a:rPr lang="en-US" dirty="0"/>
+              <a:t> (</a:t>
+            </a:r>
+            <a:r>
+              <a:rPr lang="en-US" dirty="0">
+                <a:hlinkClick r:id="rId5"/>
+              </a:rPr>
+              <a:t>docs</a:t>
+            </a:r>
+            <a:r>
+              <a:rPr lang="en-US" dirty="0"/>
+              <a:t>)</a:t>
+            </a:r>
+          </a:p>
+        </p:txBody>
+      </p:sp>
+      <p:sp>
+        <p:nvSpPr>
+          <p:cNvPr id="6" name="Text Placeholder 5">
+            <a:extLst>
+              <a:ext uri="{FF2B5EF4-FFF2-40B4-BE49-F238E27FC236}">
+                <a16:creationId xmlns:a16="http://schemas.microsoft.com/office/drawing/2014/main" id="{45CC3CD2-13B7-49F0-BF5F-46A2C11C7A6E}"/>
+              </a:ext>
+            </a:extLst>
+          </p:cNvPr>
+          <p:cNvSpPr>
+            <a:spLocks noGrp="1"/>
+          </p:cNvSpPr>
+          <p:nvPr>
+            <p:ph type="body" sz="quarter" idx="23"/>
+          </p:nvPr>
+        </p:nvSpPr>
+        <p:spPr/>
+        <p:txBody>
+          <a:bodyPr/>
+          <a:lstStyle/>
+          <a:p>
+            <a:r>
+              <a:rPr lang="en-US" dirty="0"/>
+              <a:t>See also </a:t>
+            </a:r>
+            <a:r>
+              <a:rPr lang="en-US" dirty="0">
+                <a:hlinkClick r:id="rId6"/>
+              </a:rPr>
+              <a:t>https://docs.microsoft.com/en-us/dotnet/framework/data/adonet/protecting-connection-information</a:t>
+            </a:r>
+            <a:endParaRPr lang="en-US" dirty="0"/>
+          </a:p>
+        </p:txBody>
+      </p:sp>
+    </p:spTree>
+    <p:extLst>
+      <p:ext uri="{BB962C8B-B14F-4D97-AF65-F5344CB8AC3E}">
+        <p14:creationId xmlns:p14="http://schemas.microsoft.com/office/powerpoint/2010/main" val="287044570"/>
+      </p:ext>
+    </p:extLst>
+  </p:cSld>
+  <p:clrMapOvr>
+    <a:masterClrMapping/>
+  </p:clrMapOvr>
+  <p:transition spd="slow">
+    <p:push/>
+  </p:transition>
+</p:sld>
+</file>
+
+<file path=ppt/slides/slide13.xml><?xml version="1.0" encoding="utf-8"?>
+<p:sld xmlns:a="http://schemas.openxmlformats.org/drawingml/2006/main" xmlns:r="http://schemas.openxmlformats.org/officeDocument/2006/relationships" xmlns:p="http://schemas.openxmlformats.org/presentationml/2006/main">
+  <p:cSld>
+    <p:spTree>
+      <p:nvGrpSpPr>
+        <p:cNvPr id="1" name=""/>
+        <p:cNvGrpSpPr/>
+        <p:nvPr/>
+      </p:nvGrpSpPr>
+      <p:grpSpPr>
+        <a:xfrm>
+          <a:off x="0" y="0"/>
+          <a:ext cx="0" cy="0"/>
+          <a:chOff x="0" y="0"/>
+          <a:chExt cx="0" cy="0"/>
+        </a:xfrm>
+      </p:grpSpPr>
+      <p:sp>
+        <p:nvSpPr>
+          <p:cNvPr id="4" name="Title 3">
+            <a:extLst>
+              <a:ext uri="{FF2B5EF4-FFF2-40B4-BE49-F238E27FC236}">
+                <a16:creationId xmlns:a16="http://schemas.microsoft.com/office/drawing/2014/main" id="{BDD3605E-FD53-466F-BE4A-2E05F5F4F85D}"/>
+              </a:ext>
+            </a:extLst>
+          </p:cNvPr>
+          <p:cNvSpPr>
+            <a:spLocks noGrp="1"/>
+          </p:cNvSpPr>
+          <p:nvPr>
+            <p:ph type="title"/>
+          </p:nvPr>
+        </p:nvSpPr>
+        <p:spPr/>
+        <p:txBody>
+          <a:bodyPr/>
+          <a:lstStyle/>
+          <a:p>
+            <a:r>
+              <a:rPr lang="en-US"/>
+              <a:t>General Guidelines</a:t>
+            </a:r>
+          </a:p>
+        </p:txBody>
+      </p:sp>
+      <p:sp>
+        <p:nvSpPr>
+          <p:cNvPr id="5" name="Content Placeholder 4">
+            <a:extLst>
+              <a:ext uri="{FF2B5EF4-FFF2-40B4-BE49-F238E27FC236}">
+                <a16:creationId xmlns:a16="http://schemas.microsoft.com/office/drawing/2014/main" id="{01F131BF-9B34-48AC-BA46-B6209F9C8653}"/>
+              </a:ext>
+            </a:extLst>
+          </p:cNvPr>
+          <p:cNvSpPr>
+            <a:spLocks noGrp="1"/>
+          </p:cNvSpPr>
+          <p:nvPr>
+            <p:ph sz="quarter" idx="12"/>
+          </p:nvPr>
+        </p:nvSpPr>
+        <p:spPr/>
+        <p:txBody>
+          <a:bodyPr/>
+          <a:lstStyle/>
+          <a:p>
+            <a:r>
+              <a:rPr lang="en-US" dirty="0"/>
+              <a:t>Recap .NET Core config system</a:t>
+            </a:r>
+          </a:p>
+          <a:p>
+            <a:pPr lvl="1"/>
+            <a:r>
+              <a:rPr lang="en-US" i="1" dirty="0"/>
+              <a:t>08-RecapNetCoreConfig</a:t>
+            </a:r>
+          </a:p>
+          <a:p>
+            <a:r>
+              <a:rPr lang="en-US" dirty="0"/>
+              <a:t>Encrypt configuration files</a:t>
+            </a:r>
+          </a:p>
+          <a:p>
+            <a:pPr lvl="1"/>
+            <a:r>
+              <a:rPr lang="en-US" dirty="0"/>
+              <a:t>ASP.NET: Use </a:t>
+            </a:r>
+            <a:r>
+              <a:rPr lang="en-US" i="1" dirty="0" err="1"/>
+              <a:t>aspnet_regiis</a:t>
+            </a:r>
+            <a:r>
+              <a:rPr lang="en-US" dirty="0"/>
+              <a:t> tool (</a:t>
+            </a:r>
+            <a:r>
+              <a:rPr lang="en-US" dirty="0">
+                <a:hlinkClick r:id="rId2"/>
+              </a:rPr>
+              <a:t>docs</a:t>
+            </a:r>
+            <a:r>
+              <a:rPr lang="en-US" dirty="0"/>
+              <a:t>)</a:t>
+            </a:r>
+          </a:p>
+          <a:p>
+            <a:pPr lvl="1"/>
+            <a:r>
+              <a:rPr lang="en-US" dirty="0"/>
+              <a:t>ASP.NET Core: </a:t>
+            </a:r>
+          </a:p>
+        </p:txBody>
+      </p:sp>
+      <p:sp>
+        <p:nvSpPr>
+          <p:cNvPr id="6" name="Text Placeholder 5">
+            <a:extLst>
+              <a:ext uri="{FF2B5EF4-FFF2-40B4-BE49-F238E27FC236}">
+                <a16:creationId xmlns:a16="http://schemas.microsoft.com/office/drawing/2014/main" id="{45CC3CD2-13B7-49F0-BF5F-46A2C11C7A6E}"/>
+              </a:ext>
+            </a:extLst>
+          </p:cNvPr>
+          <p:cNvSpPr>
+            <a:spLocks noGrp="1"/>
+          </p:cNvSpPr>
+          <p:nvPr>
+            <p:ph type="body" sz="quarter" idx="23"/>
+          </p:nvPr>
+        </p:nvSpPr>
+        <p:spPr/>
+        <p:txBody>
+          <a:bodyPr/>
+          <a:lstStyle/>
+          <a:p>
+            <a:r>
+              <a:rPr lang="en-US" dirty="0"/>
+              <a:t>See also </a:t>
+            </a:r>
+            <a:r>
+              <a:rPr lang="en-US" dirty="0">
+                <a:hlinkClick r:id="rId3"/>
+              </a:rPr>
+              <a:t>https://docs.microsoft.com/en-us/dotnet/framework/data/adonet/protecting-connection-information</a:t>
+            </a:r>
+            <a:endParaRPr lang="en-US" dirty="0"/>
+          </a:p>
+        </p:txBody>
+      </p:sp>
+    </p:spTree>
+    <p:extLst>
+      <p:ext uri="{BB962C8B-B14F-4D97-AF65-F5344CB8AC3E}">
+        <p14:creationId xmlns:p14="http://schemas.microsoft.com/office/powerpoint/2010/main" val="2774263431"/>
+      </p:ext>
+    </p:extLst>
+  </p:cSld>
+  <p:clrMapOvr>
+    <a:masterClrMapping/>
+  </p:clrMapOvr>
+  <p:transition spd="slow">
+    <p:push/>
+  </p:transition>
+</p:sld>
+</file>
+
+<file path=ppt/slides/slide14.xml><?xml version="1.0" encoding="utf-8"?>
+<p:sld xmlns:a="http://schemas.openxmlformats.org/drawingml/2006/main" xmlns:r="http://schemas.openxmlformats.org/officeDocument/2006/relationships" xmlns:p="http://schemas.openxmlformats.org/presentationml/2006/main">
+  <p:cSld>
+    <p:spTree>
+      <p:nvGrpSpPr>
+        <p:cNvPr id="1" name=""/>
+        <p:cNvGrpSpPr/>
+        <p:nvPr/>
+      </p:nvGrpSpPr>
+      <p:grpSpPr>
+        <a:xfrm>
+          <a:off x="0" y="0"/>
+          <a:ext cx="0" cy="0"/>
+          <a:chOff x="0" y="0"/>
+          <a:chExt cx="0" cy="0"/>
+        </a:xfrm>
+      </p:grpSpPr>
+      <p:sp>
+        <p:nvSpPr>
+          <p:cNvPr id="2" name="Title 1">
+            <a:extLst>
+              <a:ext uri="{FF2B5EF4-FFF2-40B4-BE49-F238E27FC236}">
+                <a16:creationId xmlns:a16="http://schemas.microsoft.com/office/drawing/2014/main" id="{DE5C6A00-2349-4081-8885-95806CB4E6A1}"/>
+              </a:ext>
+            </a:extLst>
+          </p:cNvPr>
+          <p:cNvSpPr>
+            <a:spLocks noGrp="1"/>
+          </p:cNvSpPr>
+          <p:nvPr>
+            <p:ph type="title"/>
+          </p:nvPr>
+        </p:nvSpPr>
+        <p:spPr/>
+        <p:txBody>
+          <a:bodyPr/>
+          <a:lstStyle/>
+          <a:p>
+            <a:r>
+              <a:rPr lang="en-US"/>
+              <a:t>Azure Managed Identity</a:t>
+            </a:r>
+          </a:p>
+        </p:txBody>
+      </p:sp>
+      <p:sp>
+        <p:nvSpPr>
+          <p:cNvPr id="3" name="Content Placeholder 2">
+            <a:extLst>
+              <a:ext uri="{FF2B5EF4-FFF2-40B4-BE49-F238E27FC236}">
+                <a16:creationId xmlns:a16="http://schemas.microsoft.com/office/drawing/2014/main" id="{A40CBCAC-290F-42CF-AF44-72322D6C858A}"/>
+              </a:ext>
+            </a:extLst>
+          </p:cNvPr>
+          <p:cNvSpPr>
+            <a:spLocks noGrp="1"/>
+          </p:cNvSpPr>
+          <p:nvPr>
+            <p:ph sz="quarter" idx="12"/>
+          </p:nvPr>
+        </p:nvSpPr>
+        <p:spPr/>
+        <p:txBody>
+          <a:bodyPr/>
+          <a:lstStyle/>
+          <a:p>
+            <a:r>
+              <a:rPr lang="en-US" dirty="0"/>
+              <a:t>Automatically managed identities for services in Azure</a:t>
+            </a:r>
+          </a:p>
+          <a:p>
+            <a:pPr lvl="1"/>
+            <a:r>
+              <a:rPr lang="en-US" dirty="0"/>
+              <a:t>Backed by Azure AD</a:t>
+            </a:r>
+          </a:p>
+          <a:p>
+            <a:pPr lvl="1"/>
+            <a:r>
+              <a:rPr lang="en-US" dirty="0"/>
+              <a:t>Goal: No credentials on developer workstations or in source control</a:t>
+            </a:r>
+          </a:p>
+          <a:p>
+            <a:r>
+              <a:rPr lang="en-US" dirty="0"/>
+              <a:t>Two types: System- or user-assigned</a:t>
+            </a:r>
+          </a:p>
+          <a:p>
+            <a:pPr lvl="1"/>
+            <a:r>
+              <a:rPr lang="en-US" dirty="0"/>
+              <a:t>More or less control over service principal creation</a:t>
+            </a:r>
+          </a:p>
+          <a:p>
+            <a:r>
+              <a:rPr lang="en-US" dirty="0"/>
+              <a:t>Supported by more and more Azure PaaS/Serverless services</a:t>
+            </a:r>
+          </a:p>
+          <a:p>
+            <a:pPr lvl="1"/>
+            <a:r>
+              <a:rPr lang="en-US" dirty="0">
+                <a:hlinkClick r:id="rId2"/>
+              </a:rPr>
+              <a:t>Docs</a:t>
+            </a:r>
+            <a:endParaRPr lang="en-US" dirty="0"/>
+          </a:p>
+          <a:p>
+            <a:pPr lvl="1"/>
+            <a:r>
+              <a:rPr lang="en-US" dirty="0"/>
+              <a:t>Here: Focus on </a:t>
+            </a:r>
+            <a:r>
+              <a:rPr lang="en-US" dirty="0">
+                <a:hlinkClick r:id="rId3"/>
+              </a:rPr>
+              <a:t>KeyVault</a:t>
+            </a:r>
+            <a:endParaRPr lang="en-US" dirty="0"/>
+          </a:p>
+        </p:txBody>
+      </p:sp>
+      <p:sp>
+        <p:nvSpPr>
+          <p:cNvPr id="4" name="Text Placeholder 3">
+            <a:extLst>
+              <a:ext uri="{FF2B5EF4-FFF2-40B4-BE49-F238E27FC236}">
+                <a16:creationId xmlns:a16="http://schemas.microsoft.com/office/drawing/2014/main" id="{4756455E-82F7-4F41-9AA2-F214DAA65B12}"/>
+              </a:ext>
+            </a:extLst>
+          </p:cNvPr>
+          <p:cNvSpPr>
+            <a:spLocks noGrp="1"/>
+          </p:cNvSpPr>
+          <p:nvPr>
+            <p:ph type="body" sz="quarter" idx="23"/>
+          </p:nvPr>
+        </p:nvSpPr>
+        <p:spPr/>
+        <p:txBody>
+          <a:bodyPr/>
+          <a:lstStyle/>
+          <a:p>
+            <a:r>
+              <a:rPr lang="en-US"/>
+              <a:t>See also </a:t>
+            </a:r>
+            <a:r>
+              <a:rPr lang="en-US">
+                <a:hlinkClick r:id="rId4"/>
+              </a:rPr>
+              <a:t>https://docs.microsoft.com/en-us/azure/active-directory/managed-identities-azure-resources/overview</a:t>
+            </a:r>
+            <a:endParaRPr lang="en-US"/>
+          </a:p>
+        </p:txBody>
+      </p:sp>
+    </p:spTree>
+    <p:extLst>
+      <p:ext uri="{BB962C8B-B14F-4D97-AF65-F5344CB8AC3E}">
+        <p14:creationId xmlns:p14="http://schemas.microsoft.com/office/powerpoint/2010/main" val="1073376354"/>
+      </p:ext>
+    </p:extLst>
+  </p:cSld>
+  <p:clrMapOvr>
+    <a:masterClrMapping/>
+  </p:clrMapOvr>
+  <p:transition spd="slow">
+    <p:push/>
+  </p:transition>
+</p:sld>
+</file>
+
+<file path=ppt/slides/slide15.xml><?xml version="1.0" encoding="utf-8"?>
+<p:sld xmlns:a="http://schemas.openxmlformats.org/drawingml/2006/main" xmlns:r="http://schemas.openxmlformats.org/officeDocument/2006/relationships" xmlns:p="http://schemas.openxmlformats.org/presentationml/2006/main">
+  <p:cSld>
+    <p:spTree>
+      <p:nvGrpSpPr>
+        <p:cNvPr id="1" name=""/>
+        <p:cNvGrpSpPr/>
+        <p:nvPr/>
+      </p:nvGrpSpPr>
+      <p:grpSpPr>
+        <a:xfrm>
+          <a:off x="0" y="0"/>
+          <a:ext cx="0" cy="0"/>
+          <a:chOff x="0" y="0"/>
+          <a:chExt cx="0" cy="0"/>
+        </a:xfrm>
+      </p:grpSpPr>
+      <p:sp>
+        <p:nvSpPr>
+          <p:cNvPr id="2" name="Title 1">
+            <a:extLst>
+              <a:ext uri="{FF2B5EF4-FFF2-40B4-BE49-F238E27FC236}">
+                <a16:creationId xmlns:a16="http://schemas.microsoft.com/office/drawing/2014/main" id="{DE5C6A00-2349-4081-8885-95806CB4E6A1}"/>
+              </a:ext>
+            </a:extLst>
+          </p:cNvPr>
+          <p:cNvSpPr>
+            <a:spLocks noGrp="1"/>
+          </p:cNvSpPr>
+          <p:nvPr>
+            <p:ph type="title"/>
+          </p:nvPr>
+        </p:nvSpPr>
+        <p:spPr/>
+        <p:txBody>
+          <a:bodyPr/>
+          <a:lstStyle/>
+          <a:p>
+            <a:r>
+              <a:rPr lang="en-US" dirty="0"/>
+              <a:t>KeyVault</a:t>
+            </a:r>
+          </a:p>
+        </p:txBody>
+      </p:sp>
+      <p:sp>
+        <p:nvSpPr>
+          <p:cNvPr id="3" name="Content Placeholder 2">
+            <a:extLst>
+              <a:ext uri="{FF2B5EF4-FFF2-40B4-BE49-F238E27FC236}">
+                <a16:creationId xmlns:a16="http://schemas.microsoft.com/office/drawing/2014/main" id="{A40CBCAC-290F-42CF-AF44-72322D6C858A}"/>
+              </a:ext>
+            </a:extLst>
+          </p:cNvPr>
+          <p:cNvSpPr>
+            <a:spLocks noGrp="1"/>
+          </p:cNvSpPr>
+          <p:nvPr>
+            <p:ph sz="quarter" idx="12"/>
+          </p:nvPr>
+        </p:nvSpPr>
+        <p:spPr/>
+        <p:txBody>
+          <a:bodyPr/>
+          <a:lstStyle/>
+          <a:p>
+            <a:r>
+              <a:rPr lang="en-US" dirty="0"/>
+              <a:t>Keep secrets, encryption keys, and certs in Azure</a:t>
+            </a:r>
+          </a:p>
+          <a:p>
+            <a:pPr lvl="1"/>
+            <a:r>
+              <a:rPr lang="en-US" dirty="0"/>
+              <a:t>Can be protected by certified HSMs</a:t>
+            </a:r>
+          </a:p>
+          <a:p>
+            <a:r>
+              <a:rPr lang="en-US" dirty="0"/>
+              <a:t>Monitor access and use</a:t>
+            </a:r>
+          </a:p>
+          <a:p>
+            <a:r>
+              <a:rPr lang="en-US" dirty="0"/>
+              <a:t>Integrated in various Azure services</a:t>
+            </a:r>
+          </a:p>
+          <a:p>
+            <a:pPr lvl="1"/>
+            <a:r>
+              <a:rPr lang="en-US" dirty="0"/>
+              <a:t>E.g. SSL certs for App Service (</a:t>
+            </a:r>
+            <a:r>
+              <a:rPr lang="en-US" dirty="0">
+                <a:hlinkClick r:id="rId2"/>
+              </a:rPr>
+              <a:t>docs</a:t>
+            </a:r>
+            <a:r>
+              <a:rPr lang="en-US" dirty="0"/>
+              <a:t>)</a:t>
+            </a:r>
+          </a:p>
+          <a:p>
+            <a:pPr lvl="1"/>
+            <a:r>
+              <a:rPr lang="en-US" dirty="0"/>
+              <a:t>E.g. </a:t>
+            </a:r>
+            <a:r>
+              <a:rPr lang="en-US" i="1" dirty="0"/>
+              <a:t>Always Encrypted</a:t>
+            </a:r>
+            <a:r>
+              <a:rPr lang="en-US" dirty="0"/>
+              <a:t> in SQL (</a:t>
+            </a:r>
+            <a:r>
+              <a:rPr lang="en-US" dirty="0">
+                <a:hlinkClick r:id="rId3"/>
+              </a:rPr>
+              <a:t>docs</a:t>
+            </a:r>
+            <a:r>
+              <a:rPr lang="en-US" dirty="0"/>
+              <a:t>)</a:t>
+            </a:r>
+          </a:p>
+          <a:p>
+            <a:r>
+              <a:rPr lang="en-US" dirty="0"/>
+              <a:t>Access to KeyVault can be protected by </a:t>
+            </a:r>
+            <a:r>
+              <a:rPr lang="en-US" i="1" dirty="0"/>
+              <a:t>Managed Identity</a:t>
+            </a:r>
+          </a:p>
+          <a:p>
+            <a:pPr lvl="1"/>
+            <a:r>
+              <a:rPr lang="en-US" dirty="0"/>
+              <a:t>Sample: </a:t>
+            </a:r>
+            <a:r>
+              <a:rPr lang="en-US" i="1" dirty="0"/>
+              <a:t>09.2-KeyVaultManagedIdentity</a:t>
+            </a:r>
+          </a:p>
+        </p:txBody>
+      </p:sp>
+      <p:sp>
+        <p:nvSpPr>
+          <p:cNvPr id="4" name="Text Placeholder 3">
+            <a:extLst>
+              <a:ext uri="{FF2B5EF4-FFF2-40B4-BE49-F238E27FC236}">
+                <a16:creationId xmlns:a16="http://schemas.microsoft.com/office/drawing/2014/main" id="{4756455E-82F7-4F41-9AA2-F214DAA65B12}"/>
+              </a:ext>
+            </a:extLst>
+          </p:cNvPr>
+          <p:cNvSpPr>
+            <a:spLocks noGrp="1"/>
+          </p:cNvSpPr>
+          <p:nvPr>
+            <p:ph type="body" sz="quarter" idx="23"/>
+          </p:nvPr>
+        </p:nvSpPr>
+        <p:spPr/>
+        <p:txBody>
+          <a:bodyPr/>
+          <a:lstStyle/>
+          <a:p>
+            <a:r>
+              <a:rPr lang="en-US" dirty="0"/>
+              <a:t>See also </a:t>
+            </a:r>
+            <a:r>
+              <a:rPr lang="de-AT" dirty="0">
+                <a:hlinkClick r:id="rId4"/>
+              </a:rPr>
+              <a:t>https://docs.microsoft.com/en-us/azure/key-vault/key-vault-overview</a:t>
+            </a:r>
+            <a:endParaRPr lang="en-US" dirty="0"/>
+          </a:p>
+        </p:txBody>
+      </p:sp>
+    </p:spTree>
+    <p:extLst>
+      <p:ext uri="{BB962C8B-B14F-4D97-AF65-F5344CB8AC3E}">
+        <p14:creationId xmlns:p14="http://schemas.microsoft.com/office/powerpoint/2010/main" val="67618888"/>
+      </p:ext>
+    </p:extLst>
+  </p:cSld>
+  <p:clrMapOvr>
+    <a:masterClrMapping/>
+  </p:clrMapOvr>
+  <p:transition spd="slow">
+    <p:push/>
+  </p:transition>
+</p:sld>
+</file>
+
+<file path=ppt/slides/slide16.xml><?xml version="1.0" encoding="utf-8"?>
+<p:sld xmlns:a="http://schemas.openxmlformats.org/drawingml/2006/main" xmlns:r="http://schemas.openxmlformats.org/officeDocument/2006/relationships" xmlns:p="http://schemas.openxmlformats.org/presentationml/2006/main">
+  <p:cSld>
+    <p:spTree>
+      <p:nvGrpSpPr>
+        <p:cNvPr id="1" name=""/>
+        <p:cNvGrpSpPr/>
+        <p:nvPr/>
+      </p:nvGrpSpPr>
+      <p:grpSpPr>
+        <a:xfrm>
+          <a:off x="0" y="0"/>
+          <a:ext cx="0" cy="0"/>
+          <a:chOff x="0" y="0"/>
+          <a:chExt cx="0" cy="0"/>
+        </a:xfrm>
+      </p:grpSpPr>
+      <p:sp>
+        <p:nvSpPr>
+          <p:cNvPr id="9" name="Text Placeholder 8"/>
+          <p:cNvSpPr>
+            <a:spLocks noGrp="1"/>
+          </p:cNvSpPr>
+          <p:nvPr>
+            <p:ph type="body" sz="quarter" idx="24"/>
+          </p:nvPr>
+        </p:nvSpPr>
+        <p:spPr>
+          <a:xfrm>
+            <a:off x="1141413" y="339725"/>
+            <a:ext cx="7751762" cy="685800"/>
+          </a:xfrm>
+        </p:spPr>
+        <p:txBody>
+          <a:bodyPr/>
+          <a:lstStyle/>
+          <a:p>
+            <a:r>
+              <a:rPr lang="en-US" dirty="0"/>
+              <a:t>Workshop</a:t>
+            </a:r>
+          </a:p>
+        </p:txBody>
+      </p:sp>
+      <p:pic>
+        <p:nvPicPr>
+          <p:cNvPr id="24" name="Content Placeholder 23"/>
+          <p:cNvPicPr>
+            <a:picLocks noGrp="1" noChangeAspect="1"/>
+          </p:cNvPicPr>
+          <p:nvPr>
+            <p:ph sz="quarter" idx="20"/>
+          </p:nvPr>
+        </p:nvPicPr>
+        <p:blipFill>
+          <a:blip r:embed="rId2" cstate="print">
+            <a:extLst>
+              <a:ext uri="{28A0092B-C50C-407E-A947-70E740481C1C}">
+                <a14:useLocalDpi xmlns:a14="http://schemas.microsoft.com/office/drawing/2010/main" val="0"/>
+              </a:ext>
+            </a:extLst>
+          </a:blip>
+          <a:stretch>
+            <a:fillRect/>
+          </a:stretch>
+        </p:blipFill>
+        <p:spPr/>
+      </p:pic>
+      <p:sp>
+        <p:nvSpPr>
+          <p:cNvPr id="2" name="Title 1"/>
+          <p:cNvSpPr>
+            <a:spLocks noGrp="1"/>
+          </p:cNvSpPr>
+          <p:nvPr>
+            <p:ph type="title"/>
+          </p:nvPr>
+        </p:nvSpPr>
+        <p:spPr/>
+        <p:txBody>
+          <a:bodyPr/>
+          <a:lstStyle/>
+          <a:p>
+            <a:r>
+              <a:rPr lang="en-US" dirty="0"/>
+              <a:t>Q&amp;A</a:t>
+            </a:r>
+          </a:p>
+        </p:txBody>
+      </p:sp>
+      <p:sp>
+        <p:nvSpPr>
+          <p:cNvPr id="3" name="Text Placeholder 2"/>
+          <p:cNvSpPr>
+            <a:spLocks noGrp="1"/>
+          </p:cNvSpPr>
+          <p:nvPr>
+            <p:ph type="body" sz="quarter" idx="12"/>
+          </p:nvPr>
+        </p:nvSpPr>
+        <p:spPr/>
+        <p:txBody>
+          <a:bodyPr/>
+          <a:lstStyle/>
+          <a:p>
+            <a:r>
+              <a:rPr lang="en-US"/>
+              <a:t>Rainer Stropek</a:t>
+            </a:r>
+          </a:p>
+        </p:txBody>
+      </p:sp>
+      <p:sp>
+        <p:nvSpPr>
+          <p:cNvPr id="4" name="Text Placeholder 3"/>
+          <p:cNvSpPr>
+            <a:spLocks noGrp="1"/>
+          </p:cNvSpPr>
+          <p:nvPr>
+            <p:ph type="body" sz="quarter" idx="13"/>
+          </p:nvPr>
+        </p:nvSpPr>
+        <p:spPr/>
+        <p:txBody>
+          <a:bodyPr/>
+          <a:lstStyle/>
+          <a:p>
+            <a:r>
+              <a:rPr lang="en-US"/>
+              <a:t>software architects gmbh</a:t>
+            </a:r>
+          </a:p>
+        </p:txBody>
+      </p:sp>
+      <p:sp>
+        <p:nvSpPr>
+          <p:cNvPr id="18" name="Text Placeholder 17"/>
+          <p:cNvSpPr>
+            <a:spLocks noGrp="1"/>
+          </p:cNvSpPr>
+          <p:nvPr>
+            <p:ph type="body" sz="quarter" idx="15"/>
+          </p:nvPr>
+        </p:nvSpPr>
+        <p:spPr/>
+        <p:txBody>
+          <a:bodyPr/>
+          <a:lstStyle/>
+          <a:p>
+            <a:r>
+              <a:rPr lang="en-US"/>
+              <a:t>rainer@timecockpit.com</a:t>
+            </a:r>
+            <a:br>
+              <a:rPr lang="en-US"/>
+            </a:br>
+            <a:r>
+              <a:rPr lang="en-US"/>
+              <a:t>http://www.timecockpit.com</a:t>
+            </a:r>
+            <a:br>
+              <a:rPr lang="en-US"/>
+            </a:br>
+            <a:r>
+              <a:rPr lang="en-US"/>
+              <a:t>@rstropek</a:t>
+            </a:r>
+          </a:p>
+        </p:txBody>
+      </p:sp>
+      <p:sp>
+        <p:nvSpPr>
+          <p:cNvPr id="10" name="Text Placeholder 9"/>
+          <p:cNvSpPr>
+            <a:spLocks noGrp="1"/>
+          </p:cNvSpPr>
+          <p:nvPr>
+            <p:ph type="body" sz="quarter" idx="25"/>
+          </p:nvPr>
+        </p:nvSpPr>
+        <p:spPr>
+          <a:xfrm>
+            <a:off x="1144588" y="3135313"/>
+            <a:ext cx="3789362" cy="366712"/>
+          </a:xfrm>
+        </p:spPr>
+        <p:txBody>
+          <a:bodyPr/>
+          <a:lstStyle/>
+          <a:p>
+            <a:r>
+              <a:rPr lang="en-US" dirty="0"/>
+              <a:t>Thank your for coming!</a:t>
+            </a:r>
+          </a:p>
+        </p:txBody>
+      </p:sp>
+      <p:sp>
+        <p:nvSpPr>
+          <p:cNvPr id="22" name="Content Placeholder 21"/>
+          <p:cNvSpPr>
+            <a:spLocks noGrp="1"/>
+          </p:cNvSpPr>
+          <p:nvPr>
+            <p:ph sz="quarter" idx="26"/>
+          </p:nvPr>
+        </p:nvSpPr>
+        <p:spPr>
+          <a:xfrm>
+            <a:off x="5218113" y="2338388"/>
+            <a:ext cx="793750" cy="796925"/>
+          </a:xfrm>
+        </p:spPr>
+        <p:txBody>
+          <a:bodyPr/>
+          <a:lstStyle/>
+          <a:p>
+            <a:r>
+              <a:rPr lang="en-US"/>
+              <a:t>Mail</a:t>
+            </a:r>
+            <a:br>
+              <a:rPr lang="en-US"/>
+            </a:br>
+            <a:r>
+              <a:rPr lang="en-US"/>
+              <a:t>Web</a:t>
+            </a:r>
+            <a:br>
+              <a:rPr lang="en-US"/>
+            </a:br>
+            <a:r>
+              <a:rPr lang="en-US"/>
+              <a:t>Twitter</a:t>
+            </a:r>
+          </a:p>
+        </p:txBody>
+      </p:sp>
+    </p:spTree>
+    <p:extLst>
+      <p:ext uri="{BB962C8B-B14F-4D97-AF65-F5344CB8AC3E}">
+        <p14:creationId xmlns:p14="http://schemas.microsoft.com/office/powerpoint/2010/main" val="4088726371"/>
+      </p:ext>
+    </p:extLst>
+  </p:cSld>
+  <p:clrMapOvr>
+    <a:masterClrMapping/>
+  </p:clrMapOvr>
+  <mc:AlternateContent xmlns:mc="http://schemas.openxmlformats.org/markup-compatibility/2006" xmlns:p14="http://schemas.microsoft.com/office/powerpoint/2010/main">
+    <mc:Choice Requires="p14">
+      <p:transition spd="med" p14:dur="700">
+        <p:fade/>
+      </p:transition>
+    </mc:Choice>
+    <mc:Fallback xmlns="">
+      <p:transition spd="med">
+        <p:fade/>
+      </p:transition>
+    </mc:Fallback>
+  </mc:AlternateContent>
+</p:sld>
+</file>
+
 <file path=ppt/slides/slide2.xml><?xml version="1.0" encoding="utf-8"?>
 <p:sld xmlns:a="http://schemas.openxmlformats.org/drawingml/2006/main" xmlns:r="http://schemas.openxmlformats.org/officeDocument/2006/relationships" xmlns:p="http://schemas.openxmlformats.org/presentationml/2006/main">
   <p:cSld>
@@ -12047,10 +13380,9 @@
           <a:lstStyle/>
           <a:p>
             <a:r>
-              <a:rPr lang="de-AT" dirty="0" err="1"/>
-              <a:t>Cryptography</a:t>
-            </a:r>
-            <a:endParaRPr lang="de-AT" dirty="0"/>
+              <a:rPr lang="de-AT" dirty="0"/>
+              <a:t>General Guidelines</a:t>
+            </a:r>
           </a:p>
         </p:txBody>
       </p:sp>
@@ -12075,14 +13407,14 @@
           <a:bodyPr/>
           <a:lstStyle/>
           <a:p>
-            <a:endParaRPr lang="de-AT"/>
+            <a:endParaRPr lang="de-AT" dirty="0"/>
           </a:p>
         </p:txBody>
       </p:sp>
     </p:spTree>
     <p:extLst>
       <p:ext uri="{BB962C8B-B14F-4D97-AF65-F5344CB8AC3E}">
-        <p14:creationId xmlns:p14="http://schemas.microsoft.com/office/powerpoint/2010/main" val="2148398201"/>
+        <p14:creationId xmlns:p14="http://schemas.microsoft.com/office/powerpoint/2010/main" val="3495780882"/>
       </p:ext>
     </p:extLst>
   </p:cSld>
@@ -12126,6 +13458,210 @@
           <p:cNvPr id="4" name="Title 3">
             <a:extLst>
               <a:ext uri="{FF2B5EF4-FFF2-40B4-BE49-F238E27FC236}">
+                <a16:creationId xmlns:a16="http://schemas.microsoft.com/office/drawing/2014/main" id="{817B7A26-5AA7-47AB-ABCB-4C5B3A34AF31}"/>
+              </a:ext>
+            </a:extLst>
+          </p:cNvPr>
+          <p:cNvSpPr>
+            <a:spLocks noGrp="1"/>
+          </p:cNvSpPr>
+          <p:nvPr>
+            <p:ph type="title"/>
+          </p:nvPr>
+        </p:nvSpPr>
+        <p:spPr/>
+        <p:txBody>
+          <a:bodyPr/>
+          <a:lstStyle/>
+          <a:p>
+            <a:endParaRPr lang="de-AT"/>
+          </a:p>
+        </p:txBody>
+      </p:sp>
+      <p:sp>
+        <p:nvSpPr>
+          <p:cNvPr id="5" name="Content Placeholder 4">
+            <a:extLst>
+              <a:ext uri="{FF2B5EF4-FFF2-40B4-BE49-F238E27FC236}">
+                <a16:creationId xmlns:a16="http://schemas.microsoft.com/office/drawing/2014/main" id="{310E7E37-F318-4E9A-BC42-0FDAF2177929}"/>
+              </a:ext>
+            </a:extLst>
+          </p:cNvPr>
+          <p:cNvSpPr>
+            <a:spLocks noGrp="1"/>
+          </p:cNvSpPr>
+          <p:nvPr>
+            <p:ph sz="quarter" idx="12"/>
+          </p:nvPr>
+        </p:nvSpPr>
+        <p:spPr/>
+        <p:txBody>
+          <a:bodyPr/>
+          <a:lstStyle/>
+          <a:p>
+            <a:endParaRPr lang="de-AT"/>
+          </a:p>
+        </p:txBody>
+      </p:sp>
+      <p:sp>
+        <p:nvSpPr>
+          <p:cNvPr id="6" name="Text Placeholder 5">
+            <a:extLst>
+              <a:ext uri="{FF2B5EF4-FFF2-40B4-BE49-F238E27FC236}">
+                <a16:creationId xmlns:a16="http://schemas.microsoft.com/office/drawing/2014/main" id="{5F85290E-E916-44AA-AA55-F4748D8D074A}"/>
+              </a:ext>
+            </a:extLst>
+          </p:cNvPr>
+          <p:cNvSpPr>
+            <a:spLocks noGrp="1"/>
+          </p:cNvSpPr>
+          <p:nvPr>
+            <p:ph type="body" sz="quarter" idx="23"/>
+          </p:nvPr>
+        </p:nvSpPr>
+        <p:spPr/>
+        <p:txBody>
+          <a:bodyPr/>
+          <a:lstStyle/>
+          <a:p>
+            <a:endParaRPr lang="de-AT"/>
+          </a:p>
+        </p:txBody>
+      </p:sp>
+    </p:spTree>
+    <p:extLst>
+      <p:ext uri="{BB962C8B-B14F-4D97-AF65-F5344CB8AC3E}">
+        <p14:creationId xmlns:p14="http://schemas.microsoft.com/office/powerpoint/2010/main" val="2052058656"/>
+      </p:ext>
+    </p:extLst>
+  </p:cSld>
+  <p:clrMapOvr>
+    <a:masterClrMapping/>
+  </p:clrMapOvr>
+  <p:transition spd="slow">
+    <p:push/>
+  </p:transition>
+</p:sld>
+</file>
+
+<file path=ppt/slides/slide4.xml><?xml version="1.0" encoding="utf-8"?>
+<p:sld xmlns:a="http://schemas.openxmlformats.org/drawingml/2006/main" xmlns:r="http://schemas.openxmlformats.org/officeDocument/2006/relationships" xmlns:p="http://schemas.openxmlformats.org/presentationml/2006/main">
+  <p:cSld>
+    <p:spTree>
+      <p:nvGrpSpPr>
+        <p:cNvPr id="1" name=""/>
+        <p:cNvGrpSpPr/>
+        <p:nvPr/>
+      </p:nvGrpSpPr>
+      <p:grpSpPr>
+        <a:xfrm>
+          <a:off x="0" y="0"/>
+          <a:ext cx="0" cy="0"/>
+          <a:chOff x="0" y="0"/>
+          <a:chExt cx="0" cy="0"/>
+        </a:xfrm>
+      </p:grpSpPr>
+      <p:sp>
+        <p:nvSpPr>
+          <p:cNvPr id="2" name="Title 1">
+            <a:extLst>
+              <a:ext uri="{FF2B5EF4-FFF2-40B4-BE49-F238E27FC236}">
+                <a16:creationId xmlns:a16="http://schemas.microsoft.com/office/drawing/2014/main" id="{F8FADD9F-D779-4FB6-A392-8DDB9F3A789C}"/>
+              </a:ext>
+            </a:extLst>
+          </p:cNvPr>
+          <p:cNvSpPr>
+            <a:spLocks noGrp="1"/>
+          </p:cNvSpPr>
+          <p:nvPr>
+            <p:ph type="title"/>
+          </p:nvPr>
+        </p:nvSpPr>
+        <p:spPr/>
+        <p:txBody>
+          <a:bodyPr/>
+          <a:lstStyle/>
+          <a:p>
+            <a:r>
+              <a:rPr lang="de-AT" dirty="0" err="1"/>
+              <a:t>Cryptography</a:t>
+            </a:r>
+            <a:endParaRPr lang="de-AT" dirty="0"/>
+          </a:p>
+        </p:txBody>
+      </p:sp>
+      <p:sp>
+        <p:nvSpPr>
+          <p:cNvPr id="3" name="Text Placeholder 2">
+            <a:extLst>
+              <a:ext uri="{FF2B5EF4-FFF2-40B4-BE49-F238E27FC236}">
+                <a16:creationId xmlns:a16="http://schemas.microsoft.com/office/drawing/2014/main" id="{72858DEE-163D-402F-981D-E182F9F8632E}"/>
+              </a:ext>
+            </a:extLst>
+          </p:cNvPr>
+          <p:cNvSpPr>
+            <a:spLocks noGrp="1"/>
+          </p:cNvSpPr>
+          <p:nvPr>
+            <p:ph type="body" sz="quarter" idx="25"/>
+          </p:nvPr>
+        </p:nvSpPr>
+        <p:spPr/>
+        <p:txBody>
+          <a:bodyPr/>
+          <a:lstStyle/>
+          <a:p>
+            <a:endParaRPr lang="de-AT"/>
+          </a:p>
+        </p:txBody>
+      </p:sp>
+    </p:spTree>
+    <p:extLst>
+      <p:ext uri="{BB962C8B-B14F-4D97-AF65-F5344CB8AC3E}">
+        <p14:creationId xmlns:p14="http://schemas.microsoft.com/office/powerpoint/2010/main" val="2148398201"/>
+      </p:ext>
+    </p:extLst>
+  </p:cSld>
+  <p:clrMapOvr>
+    <a:masterClrMapping/>
+  </p:clrMapOvr>
+  <mc:AlternateContent xmlns:mc="http://schemas.openxmlformats.org/markup-compatibility/2006" xmlns:p14="http://schemas.microsoft.com/office/powerpoint/2010/main">
+    <mc:Choice Requires="p14">
+      <p:transition spd="med" p14:dur="700">
+        <p:fade/>
+      </p:transition>
+    </mc:Choice>
+    <mc:Fallback xmlns="">
+      <p:transition spd="med">
+        <p:fade/>
+      </p:transition>
+    </mc:Fallback>
+  </mc:AlternateContent>
+</p:sld>
+</file>
+
+<file path=ppt/slides/slide5.xml><?xml version="1.0" encoding="utf-8"?>
+<p:sld xmlns:a="http://schemas.openxmlformats.org/drawingml/2006/main" xmlns:r="http://schemas.openxmlformats.org/officeDocument/2006/relationships" xmlns:p="http://schemas.openxmlformats.org/presentationml/2006/main">
+  <p:cSld>
+    <p:spTree>
+      <p:nvGrpSpPr>
+        <p:cNvPr id="1" name=""/>
+        <p:cNvGrpSpPr/>
+        <p:nvPr/>
+      </p:nvGrpSpPr>
+      <p:grpSpPr>
+        <a:xfrm>
+          <a:off x="0" y="0"/>
+          <a:ext cx="0" cy="0"/>
+          <a:chOff x="0" y="0"/>
+          <a:chExt cx="0" cy="0"/>
+        </a:xfrm>
+      </p:grpSpPr>
+      <p:sp>
+        <p:nvSpPr>
+          <p:cNvPr id="4" name="Title 3">
+            <a:extLst>
+              <a:ext uri="{FF2B5EF4-FFF2-40B4-BE49-F238E27FC236}">
                 <a16:creationId xmlns:a16="http://schemas.microsoft.com/office/drawing/2014/main" id="{F7D06A31-CAA6-4A1D-95CF-6E7BDF91F333}"/>
               </a:ext>
             </a:extLst>
@@ -12518,7 +14054,47 @@
           <a:bodyPr/>
           <a:lstStyle/>
           <a:p>
-            <a:endParaRPr lang="en-US"/>
+            <a:r>
+              <a:rPr lang="en-US" dirty="0"/>
+              <a:t>See also </a:t>
+            </a:r>
+            <a:r>
+              <a:rPr lang="de-AT" dirty="0">
+                <a:hlinkClick r:id="rId12"/>
+              </a:rPr>
+              <a:t>Recommended </a:t>
+            </a:r>
+            <a:r>
+              <a:rPr lang="de-AT" dirty="0" err="1">
+                <a:hlinkClick r:id="rId12"/>
+              </a:rPr>
+              <a:t>algorithms</a:t>
+            </a:r>
+            <a:r>
+              <a:rPr lang="de-AT" dirty="0">
+                <a:hlinkClick r:id="rId12"/>
+              </a:rPr>
+              <a:t> </a:t>
+            </a:r>
+            <a:r>
+              <a:rPr lang="de-AT" dirty="0" err="1">
+                <a:hlinkClick r:id="rId12"/>
+              </a:rPr>
+              <a:t>by</a:t>
+            </a:r>
+            <a:r>
+              <a:rPr lang="de-AT" dirty="0">
+                <a:hlinkClick r:id="rId12"/>
+              </a:rPr>
+              <a:t> </a:t>
+            </a:r>
+            <a:r>
+              <a:rPr lang="de-AT" dirty="0" err="1">
+                <a:hlinkClick r:id="rId12"/>
+              </a:rPr>
+              <a:t>application</a:t>
+            </a:r>
+            <a:endParaRPr lang="en-US" dirty="0"/>
           </a:p>
         </p:txBody>
       </p:sp>
@@ -12538,7 +14114,7 @@
 </p:sld>
 </file>
 
-<file path=ppt/slides/slide4.xml><?xml version="1.0" encoding="utf-8"?>
+<file path=ppt/slides/slide6.xml><?xml version="1.0" encoding="utf-8"?>
 <p:sld xmlns:a="http://schemas.openxmlformats.org/drawingml/2006/main" xmlns:r="http://schemas.openxmlformats.org/officeDocument/2006/relationships" xmlns:p="http://schemas.openxmlformats.org/presentationml/2006/main">
   <p:cSld>
     <p:spTree>
@@ -12689,7 +14265,158 @@
 </p:sld>
 </file>
 
-<file path=ppt/slides/slide5.xml><?xml version="1.0" encoding="utf-8"?>
+<file path=ppt/slides/slide7.xml><?xml version="1.0" encoding="utf-8"?>
+<p:sld xmlns:a="http://schemas.openxmlformats.org/drawingml/2006/main" xmlns:r="http://schemas.openxmlformats.org/officeDocument/2006/relationships" xmlns:p="http://schemas.openxmlformats.org/presentationml/2006/main">
+  <p:cSld>
+    <p:spTree>
+      <p:nvGrpSpPr>
+        <p:cNvPr id="1" name=""/>
+        <p:cNvGrpSpPr/>
+        <p:nvPr/>
+      </p:nvGrpSpPr>
+      <p:grpSpPr>
+        <a:xfrm>
+          <a:off x="0" y="0"/>
+          <a:ext cx="0" cy="0"/>
+          <a:chOff x="0" y="0"/>
+          <a:chExt cx="0" cy="0"/>
+        </a:xfrm>
+      </p:grpSpPr>
+      <p:sp>
+        <p:nvSpPr>
+          <p:cNvPr id="2" name="Title 1">
+            <a:extLst>
+              <a:ext uri="{FF2B5EF4-FFF2-40B4-BE49-F238E27FC236}">
+                <a16:creationId xmlns:a16="http://schemas.microsoft.com/office/drawing/2014/main" id="{420B3033-DFBD-48DA-B34E-75003EC3BCE6}"/>
+              </a:ext>
+            </a:extLst>
+          </p:cNvPr>
+          <p:cNvSpPr>
+            <a:spLocks noGrp="1"/>
+          </p:cNvSpPr>
+          <p:nvPr>
+            <p:ph type="title"/>
+          </p:nvPr>
+        </p:nvSpPr>
+        <p:spPr/>
+        <p:txBody>
+          <a:bodyPr/>
+          <a:lstStyle/>
+          <a:p>
+            <a:r>
+              <a:rPr lang="en-US"/>
+              <a:t>Random Numbers</a:t>
+            </a:r>
+          </a:p>
+        </p:txBody>
+      </p:sp>
+      <p:sp>
+        <p:nvSpPr>
+          <p:cNvPr id="3" name="Content Placeholder 2">
+            <a:extLst>
+              <a:ext uri="{FF2B5EF4-FFF2-40B4-BE49-F238E27FC236}">
+                <a16:creationId xmlns:a16="http://schemas.microsoft.com/office/drawing/2014/main" id="{612B6AA0-7262-4D3E-836C-09EBD0B56B93}"/>
+              </a:ext>
+            </a:extLst>
+          </p:cNvPr>
+          <p:cNvSpPr>
+            <a:spLocks noGrp="1"/>
+          </p:cNvSpPr>
+          <p:nvPr>
+            <p:ph sz="quarter" idx="12"/>
+          </p:nvPr>
+        </p:nvSpPr>
+        <p:spPr/>
+        <p:txBody>
+          <a:bodyPr/>
+          <a:lstStyle/>
+          <a:p>
+            <a:r>
+              <a:rPr lang="en-US"/>
+              <a:t>Pseudo-random numbers</a:t>
+            </a:r>
+          </a:p>
+          <a:p>
+            <a:pPr lvl="1"/>
+            <a:r>
+              <a:rPr lang="en-US" i="1"/>
+              <a:t>System.Random</a:t>
+            </a:r>
+          </a:p>
+          <a:p>
+            <a:pPr lvl="1"/>
+            <a:r>
+              <a:rPr lang="en-US"/>
+              <a:t>Predictable</a:t>
+            </a:r>
+          </a:p>
+          <a:p>
+            <a:r>
+              <a:rPr lang="en-US"/>
+              <a:t>Secure random numbers</a:t>
+            </a:r>
+          </a:p>
+          <a:p>
+            <a:pPr lvl="1"/>
+            <a:r>
+              <a:rPr lang="en-US" i="1"/>
+              <a:t>RNGCryptoServiceProvider</a:t>
+            </a:r>
+          </a:p>
+        </p:txBody>
+      </p:sp>
+      <p:sp>
+        <p:nvSpPr>
+          <p:cNvPr id="4" name="Text Placeholder 3">
+            <a:extLst>
+              <a:ext uri="{FF2B5EF4-FFF2-40B4-BE49-F238E27FC236}">
+                <a16:creationId xmlns:a16="http://schemas.microsoft.com/office/drawing/2014/main" id="{2F55BBF1-8FB8-4863-8B14-CE0BEFFAF2D6}"/>
+              </a:ext>
+            </a:extLst>
+          </p:cNvPr>
+          <p:cNvSpPr>
+            <a:spLocks noGrp="1"/>
+          </p:cNvSpPr>
+          <p:nvPr>
+            <p:ph type="body" sz="quarter" idx="23"/>
+          </p:nvPr>
+        </p:nvSpPr>
+        <p:spPr/>
+        <p:txBody>
+          <a:bodyPr/>
+          <a:lstStyle/>
+          <a:p>
+            <a:r>
+              <a:rPr lang="en-US"/>
+              <a:t>See also </a:t>
+            </a:r>
+            <a:r>
+              <a:rPr lang="en-US">
+                <a:hlinkClick r:id="rId2"/>
+              </a:rPr>
+              <a:t>https://lowleveldesign.org/2018/08/15/randomness-in-net/</a:t>
+            </a:r>
+            <a:endParaRPr lang="en-US"/>
+          </a:p>
+        </p:txBody>
+      </p:sp>
+    </p:spTree>
+    <p:extLst>
+      <p:ext uri="{BB962C8B-B14F-4D97-AF65-F5344CB8AC3E}">
+        <p14:creationId xmlns:p14="http://schemas.microsoft.com/office/powerpoint/2010/main" val="2383227100"/>
+      </p:ext>
+    </p:extLst>
+  </p:cSld>
+  <p:clrMapOvr>
+    <a:masterClrMapping/>
+  </p:clrMapOvr>
+  <p:transition spd="slow">
+    <p:push/>
+  </p:transition>
+</p:sld>
+</file>
+
+<file path=ppt/slides/slide8.xml><?xml version="1.0" encoding="utf-8"?>
 <p:sld xmlns:a="http://schemas.openxmlformats.org/drawingml/2006/main" xmlns:r="http://schemas.openxmlformats.org/officeDocument/2006/relationships" xmlns:p="http://schemas.openxmlformats.org/presentationml/2006/main">
   <p:cSld>
     <p:spTree>
@@ -12858,157 +14585,7 @@
 </p:sld>
 </file>
 
-<file path=ppt/slides/slide6.xml><?xml version="1.0" encoding="utf-8"?>
-<p:sld xmlns:a="http://schemas.openxmlformats.org/drawingml/2006/main" xmlns:r="http://schemas.openxmlformats.org/officeDocument/2006/relationships" xmlns:p="http://schemas.openxmlformats.org/presentationml/2006/main">
-  <p:cSld>
-    <p:spTree>
-      <p:nvGrpSpPr>
-        <p:cNvPr id="1" name=""/>
-        <p:cNvGrpSpPr/>
-        <p:nvPr/>
-      </p:nvGrpSpPr>
-      <p:grpSpPr>
-        <a:xfrm>
-          <a:off x="0" y="0"/>
-          <a:ext cx="0" cy="0"/>
-          <a:chOff x="0" y="0"/>
-          <a:chExt cx="0" cy="0"/>
-        </a:xfrm>
-      </p:grpSpPr>
-      <p:sp>
-        <p:nvSpPr>
-          <p:cNvPr id="2" name="Title 1">
-            <a:extLst>
-              <a:ext uri="{FF2B5EF4-FFF2-40B4-BE49-F238E27FC236}">
-                <a16:creationId xmlns:a16="http://schemas.microsoft.com/office/drawing/2014/main" id="{64A1225C-D095-4E0E-815F-A53B73B18B79}"/>
-              </a:ext>
-            </a:extLst>
-          </p:cNvPr>
-          <p:cNvSpPr>
-            <a:spLocks noGrp="1"/>
-          </p:cNvSpPr>
-          <p:nvPr>
-            <p:ph type="title"/>
-          </p:nvPr>
-        </p:nvSpPr>
-        <p:spPr/>
-        <p:txBody>
-          <a:bodyPr/>
-          <a:lstStyle/>
-          <a:p>
-            <a:r>
-              <a:rPr lang="de-AT" dirty="0"/>
-              <a:t>Resources</a:t>
-            </a:r>
-          </a:p>
-        </p:txBody>
-      </p:sp>
-      <p:sp>
-        <p:nvSpPr>
-          <p:cNvPr id="3" name="Content Placeholder 2">
-            <a:extLst>
-              <a:ext uri="{FF2B5EF4-FFF2-40B4-BE49-F238E27FC236}">
-                <a16:creationId xmlns:a16="http://schemas.microsoft.com/office/drawing/2014/main" id="{19A24615-69F1-484F-9A39-5EFF850252AC}"/>
-              </a:ext>
-            </a:extLst>
-          </p:cNvPr>
-          <p:cNvSpPr>
-            <a:spLocks noGrp="1"/>
-          </p:cNvSpPr>
-          <p:nvPr>
-            <p:ph sz="quarter" idx="12"/>
-          </p:nvPr>
-        </p:nvSpPr>
-        <p:spPr/>
-        <p:txBody>
-          <a:bodyPr/>
-          <a:lstStyle/>
-          <a:p>
-            <a:r>
-              <a:rPr lang="de-AT" dirty="0">
-                <a:hlinkClick r:id="rId2"/>
-              </a:rPr>
-              <a:t>Recommended </a:t>
-            </a:r>
-            <a:r>
-              <a:rPr lang="de-AT" dirty="0" err="1">
-                <a:hlinkClick r:id="rId2"/>
-              </a:rPr>
-              <a:t>algorithms</a:t>
-            </a:r>
-            <a:r>
-              <a:rPr lang="de-AT" dirty="0">
-                <a:hlinkClick r:id="rId2"/>
-              </a:rPr>
-              <a:t> </a:t>
-            </a:r>
-            <a:r>
-              <a:rPr lang="de-AT" dirty="0" err="1">
-                <a:hlinkClick r:id="rId2"/>
-              </a:rPr>
-              <a:t>by</a:t>
-            </a:r>
-            <a:r>
-              <a:rPr lang="de-AT" dirty="0">
-                <a:hlinkClick r:id="rId2"/>
-              </a:rPr>
-              <a:t> </a:t>
-            </a:r>
-            <a:r>
-              <a:rPr lang="de-AT" dirty="0" err="1">
-                <a:hlinkClick r:id="rId2"/>
-              </a:rPr>
-              <a:t>application</a:t>
-            </a:r>
-            <a:endParaRPr lang="de-AT" dirty="0"/>
-          </a:p>
-          <a:p>
-            <a:endParaRPr lang="de-AT" dirty="0"/>
-          </a:p>
-        </p:txBody>
-      </p:sp>
-      <p:sp>
-        <p:nvSpPr>
-          <p:cNvPr id="4" name="Text Placeholder 3">
-            <a:extLst>
-              <a:ext uri="{FF2B5EF4-FFF2-40B4-BE49-F238E27FC236}">
-                <a16:creationId xmlns:a16="http://schemas.microsoft.com/office/drawing/2014/main" id="{5B424404-0443-42C3-AAB2-0F5FB72C6F64}"/>
-              </a:ext>
-            </a:extLst>
-          </p:cNvPr>
-          <p:cNvSpPr>
-            <a:spLocks noGrp="1"/>
-          </p:cNvSpPr>
-          <p:nvPr>
-            <p:ph type="body" sz="quarter" idx="23"/>
-          </p:nvPr>
-        </p:nvSpPr>
-        <p:spPr/>
-        <p:txBody>
-          <a:bodyPr/>
-          <a:lstStyle/>
-          <a:p>
-            <a:endParaRPr lang="de-AT"/>
-          </a:p>
-        </p:txBody>
-      </p:sp>
-    </p:spTree>
-    <p:extLst>
-      <p:ext uri="{BB962C8B-B14F-4D97-AF65-F5344CB8AC3E}">
-        <p14:creationId xmlns:p14="http://schemas.microsoft.com/office/powerpoint/2010/main" val="3548897450"/>
-      </p:ext>
-    </p:extLst>
-  </p:cSld>
-  <p:clrMapOvr>
-    <a:masterClrMapping/>
-  </p:clrMapOvr>
-  <p:transition spd="slow">
-    <p:push/>
-  </p:transition>
-</p:sld>
-</file>
-
-<file path=ppt/slides/slide7.xml><?xml version="1.0" encoding="utf-8"?>
+<file path=ppt/slides/slide9.xml><?xml version="1.0" encoding="utf-8"?>
 <p:sld xmlns:a="http://schemas.openxmlformats.org/drawingml/2006/main" xmlns:r="http://schemas.openxmlformats.org/officeDocument/2006/relationships" xmlns:p="http://schemas.openxmlformats.org/presentationml/2006/main">
   <p:cSld>
     <p:spTree>
@@ -13170,395 +14747,6 @@
   <p:transition spd="slow">
     <p:push/>
   </p:transition>
-</p:sld>
-</file>
-
-<file path=ppt/slides/slide8.xml><?xml version="1.0" encoding="utf-8"?>
-<p:sld xmlns:a="http://schemas.openxmlformats.org/drawingml/2006/main" xmlns:r="http://schemas.openxmlformats.org/officeDocument/2006/relationships" xmlns:p="http://schemas.openxmlformats.org/presentationml/2006/main">
-  <p:cSld>
-    <p:spTree>
-      <p:nvGrpSpPr>
-        <p:cNvPr id="1" name=""/>
-        <p:cNvGrpSpPr/>
-        <p:nvPr/>
-      </p:nvGrpSpPr>
-      <p:grpSpPr>
-        <a:xfrm>
-          <a:off x="0" y="0"/>
-          <a:ext cx="0" cy="0"/>
-          <a:chOff x="0" y="0"/>
-          <a:chExt cx="0" cy="0"/>
-        </a:xfrm>
-      </p:grpSpPr>
-      <p:sp>
-        <p:nvSpPr>
-          <p:cNvPr id="2" name="Title 1">
-            <a:extLst>
-              <a:ext uri="{FF2B5EF4-FFF2-40B4-BE49-F238E27FC236}">
-                <a16:creationId xmlns:a16="http://schemas.microsoft.com/office/drawing/2014/main" id="{2572AE16-A283-4B2F-B9A5-A97D08773560}"/>
-              </a:ext>
-            </a:extLst>
-          </p:cNvPr>
-          <p:cNvSpPr>
-            <a:spLocks noGrp="1"/>
-          </p:cNvSpPr>
-          <p:nvPr>
-            <p:ph type="title"/>
-          </p:nvPr>
-        </p:nvSpPr>
-        <p:spPr/>
-        <p:txBody>
-          <a:bodyPr/>
-          <a:lstStyle/>
-          <a:p>
-            <a:r>
-              <a:rPr lang="en-US"/>
-              <a:t>Examples</a:t>
-            </a:r>
-          </a:p>
-        </p:txBody>
-      </p:sp>
-      <p:sp>
-        <p:nvSpPr>
-          <p:cNvPr id="3" name="Content Placeholder 2">
-            <a:extLst>
-              <a:ext uri="{FF2B5EF4-FFF2-40B4-BE49-F238E27FC236}">
-                <a16:creationId xmlns:a16="http://schemas.microsoft.com/office/drawing/2014/main" id="{189993DB-6F02-4D83-9680-D34AEF0E7BB5}"/>
-              </a:ext>
-            </a:extLst>
-          </p:cNvPr>
-          <p:cNvSpPr>
-            <a:spLocks noGrp="1"/>
-          </p:cNvSpPr>
-          <p:nvPr>
-            <p:ph sz="quarter" idx="12"/>
-          </p:nvPr>
-        </p:nvSpPr>
-        <p:spPr/>
-        <p:txBody>
-          <a:bodyPr/>
-          <a:lstStyle/>
-          <a:p>
-            <a:r>
-              <a:rPr lang="en-US" dirty="0"/>
-              <a:t>06-BCrypt</a:t>
-            </a:r>
-          </a:p>
-          <a:p>
-            <a:pPr lvl="1"/>
-            <a:r>
-              <a:rPr lang="en-US" dirty="0"/>
-              <a:t>Hash passwords with </a:t>
-            </a:r>
-            <a:r>
-              <a:rPr lang="en-US" i="1" dirty="0" err="1"/>
-              <a:t>BCrypt</a:t>
-            </a:r>
-            <a:endParaRPr lang="en-US" i="1" dirty="0"/>
-          </a:p>
-        </p:txBody>
-      </p:sp>
-      <p:sp>
-        <p:nvSpPr>
-          <p:cNvPr id="4" name="Text Placeholder 3">
-            <a:extLst>
-              <a:ext uri="{FF2B5EF4-FFF2-40B4-BE49-F238E27FC236}">
-                <a16:creationId xmlns:a16="http://schemas.microsoft.com/office/drawing/2014/main" id="{0B3F959B-5A8B-4040-981A-0EBAC93AE572}"/>
-              </a:ext>
-            </a:extLst>
-          </p:cNvPr>
-          <p:cNvSpPr>
-            <a:spLocks noGrp="1"/>
-          </p:cNvSpPr>
-          <p:nvPr>
-            <p:ph type="body" sz="quarter" idx="23"/>
-          </p:nvPr>
-        </p:nvSpPr>
-        <p:spPr/>
-        <p:txBody>
-          <a:bodyPr/>
-          <a:lstStyle/>
-          <a:p>
-            <a:endParaRPr lang="en-US"/>
-          </a:p>
-        </p:txBody>
-      </p:sp>
-    </p:spTree>
-    <p:extLst>
-      <p:ext uri="{BB962C8B-B14F-4D97-AF65-F5344CB8AC3E}">
-        <p14:creationId xmlns:p14="http://schemas.microsoft.com/office/powerpoint/2010/main" val="1295082866"/>
-      </p:ext>
-    </p:extLst>
-  </p:cSld>
-  <p:clrMapOvr>
-    <a:masterClrMapping/>
-  </p:clrMapOvr>
-  <p:transition spd="slow">
-    <p:push/>
-  </p:transition>
-</p:sld>
-</file>
-
-<file path=ppt/slides/slide9.xml><?xml version="1.0" encoding="utf-8"?>
-<p:sld xmlns:a="http://schemas.openxmlformats.org/drawingml/2006/main" xmlns:r="http://schemas.openxmlformats.org/officeDocument/2006/relationships" xmlns:p="http://schemas.openxmlformats.org/presentationml/2006/main">
-  <p:cSld>
-    <p:spTree>
-      <p:nvGrpSpPr>
-        <p:cNvPr id="1" name=""/>
-        <p:cNvGrpSpPr/>
-        <p:nvPr/>
-      </p:nvGrpSpPr>
-      <p:grpSpPr>
-        <a:xfrm>
-          <a:off x="0" y="0"/>
-          <a:ext cx="0" cy="0"/>
-          <a:chOff x="0" y="0"/>
-          <a:chExt cx="0" cy="0"/>
-        </a:xfrm>
-      </p:grpSpPr>
-      <p:sp>
-        <p:nvSpPr>
-          <p:cNvPr id="9" name="Text Placeholder 8"/>
-          <p:cNvSpPr>
-            <a:spLocks noGrp="1"/>
-          </p:cNvSpPr>
-          <p:nvPr>
-            <p:ph type="body" sz="quarter" idx="24"/>
-          </p:nvPr>
-        </p:nvSpPr>
-        <p:spPr>
-          <a:xfrm>
-            <a:off x="1141413" y="339725"/>
-            <a:ext cx="7751762" cy="685800"/>
-          </a:xfrm>
-        </p:spPr>
-        <p:txBody>
-          <a:bodyPr/>
-          <a:lstStyle/>
-          <a:p>
-            <a:r>
-              <a:rPr lang="en-US" dirty="0"/>
-              <a:t>Workshop</a:t>
-            </a:r>
-          </a:p>
-        </p:txBody>
-      </p:sp>
-      <p:pic>
-        <p:nvPicPr>
-          <p:cNvPr id="24" name="Content Placeholder 23"/>
-          <p:cNvPicPr>
-            <a:picLocks noGrp="1" noChangeAspect="1"/>
-          </p:cNvPicPr>
-          <p:nvPr>
-            <p:ph sz="quarter" idx="20"/>
-          </p:nvPr>
-        </p:nvPicPr>
-        <p:blipFill>
-          <a:blip r:embed="rId2" cstate="print">
-            <a:extLst>
-              <a:ext uri="{28A0092B-C50C-407E-A947-70E740481C1C}">
-                <a14:useLocalDpi xmlns:a14="http://schemas.microsoft.com/office/drawing/2010/main" val="0"/>
-              </a:ext>
-            </a:extLst>
-          </a:blip>
-          <a:stretch>
-            <a:fillRect/>
-          </a:stretch>
-        </p:blipFill>
-        <p:spPr/>
-      </p:pic>
-      <p:sp>
-        <p:nvSpPr>
-          <p:cNvPr id="2" name="Title 1"/>
-          <p:cNvSpPr>
-            <a:spLocks noGrp="1"/>
-          </p:cNvSpPr>
-          <p:nvPr>
-            <p:ph type="title"/>
-          </p:nvPr>
-        </p:nvSpPr>
-        <p:spPr/>
-        <p:txBody>
-          <a:bodyPr/>
-          <a:lstStyle/>
-          <a:p>
-            <a:r>
-              <a:rPr lang="en-US" dirty="0"/>
-              <a:t>Q&amp;A</a:t>
-            </a:r>
-          </a:p>
-        </p:txBody>
-      </p:sp>
-      <p:sp>
-        <p:nvSpPr>
-          <p:cNvPr id="3" name="Text Placeholder 2"/>
-          <p:cNvSpPr>
-            <a:spLocks noGrp="1"/>
-          </p:cNvSpPr>
-          <p:nvPr>
-            <p:ph type="body" sz="quarter" idx="12"/>
-          </p:nvPr>
-        </p:nvSpPr>
-        <p:spPr/>
-        <p:txBody>
-          <a:bodyPr/>
-          <a:lstStyle/>
-          <a:p>
-            <a:r>
-              <a:rPr lang="en-US"/>
-              <a:t>Rainer Stropek</a:t>
-            </a:r>
-          </a:p>
-        </p:txBody>
-      </p:sp>
-      <p:sp>
-        <p:nvSpPr>
-          <p:cNvPr id="4" name="Text Placeholder 3"/>
-          <p:cNvSpPr>
-            <a:spLocks noGrp="1"/>
-          </p:cNvSpPr>
-          <p:nvPr>
-            <p:ph type="body" sz="quarter" idx="13"/>
-          </p:nvPr>
-        </p:nvSpPr>
-        <p:spPr/>
-        <p:txBody>
-          <a:bodyPr/>
-          <a:lstStyle/>
-          <a:p>
-            <a:r>
-              <a:rPr lang="en-US"/>
-              <a:t>software architects gmbh</a:t>
-            </a:r>
-          </a:p>
-        </p:txBody>
-      </p:sp>
-      <p:sp>
-        <p:nvSpPr>
-          <p:cNvPr id="18" name="Text Placeholder 17"/>
-          <p:cNvSpPr>
-            <a:spLocks noGrp="1"/>
-          </p:cNvSpPr>
-          <p:nvPr>
-            <p:ph type="body" sz="quarter" idx="15"/>
-          </p:nvPr>
-        </p:nvSpPr>
-        <p:spPr/>
-        <p:txBody>
-          <a:bodyPr/>
-          <a:lstStyle/>
-          <a:p>
-            <a:r>
-              <a:rPr lang="en-US"/>
-              <a:t>rainer@timecockpit.com</a:t>
-            </a:r>
-            <a:br>
-              <a:rPr lang="en-US"/>
-            </a:br>
-            <a:r>
-              <a:rPr lang="en-US"/>
-              <a:t>http://www.timecockpit.com</a:t>
-            </a:r>
-            <a:br>
-              <a:rPr lang="en-US"/>
-            </a:br>
-            <a:r>
-              <a:rPr lang="en-US"/>
-              <a:t>@rstropek</a:t>
-            </a:r>
-          </a:p>
-        </p:txBody>
-      </p:sp>
-      <p:sp>
-        <p:nvSpPr>
-          <p:cNvPr id="10" name="Text Placeholder 9"/>
-          <p:cNvSpPr>
-            <a:spLocks noGrp="1"/>
-          </p:cNvSpPr>
-          <p:nvPr>
-            <p:ph type="body" sz="quarter" idx="25"/>
-          </p:nvPr>
-        </p:nvSpPr>
-        <p:spPr>
-          <a:xfrm>
-            <a:off x="1144588" y="3135313"/>
-            <a:ext cx="3789362" cy="366712"/>
-          </a:xfrm>
-        </p:spPr>
-        <p:txBody>
-          <a:bodyPr/>
-          <a:lstStyle/>
-          <a:p>
-            <a:r>
-              <a:rPr lang="en-US" dirty="0"/>
-              <a:t>Thank your for coming!</a:t>
-            </a:r>
-          </a:p>
-        </p:txBody>
-      </p:sp>
-      <p:sp>
-        <p:nvSpPr>
-          <p:cNvPr id="22" name="Content Placeholder 21"/>
-          <p:cNvSpPr>
-            <a:spLocks noGrp="1"/>
-          </p:cNvSpPr>
-          <p:nvPr>
-            <p:ph sz="quarter" idx="26"/>
-          </p:nvPr>
-        </p:nvSpPr>
-        <p:spPr>
-          <a:xfrm>
-            <a:off x="5218113" y="2338388"/>
-            <a:ext cx="793750" cy="796925"/>
-          </a:xfrm>
-        </p:spPr>
-        <p:txBody>
-          <a:bodyPr/>
-          <a:lstStyle/>
-          <a:p>
-            <a:r>
-              <a:rPr lang="en-US"/>
-              <a:t>Mail</a:t>
-            </a:r>
-            <a:br>
-              <a:rPr lang="en-US"/>
-            </a:br>
-            <a:r>
-              <a:rPr lang="en-US"/>
-              <a:t>Web</a:t>
-            </a:r>
-            <a:br>
-              <a:rPr lang="en-US"/>
-            </a:br>
-            <a:r>
-              <a:rPr lang="en-US"/>
-              <a:t>Twitter</a:t>
-            </a:r>
-          </a:p>
-        </p:txBody>
-      </p:sp>
-    </p:spTree>
-    <p:extLst>
-      <p:ext uri="{BB962C8B-B14F-4D97-AF65-F5344CB8AC3E}">
-        <p14:creationId xmlns:p14="http://schemas.microsoft.com/office/powerpoint/2010/main" val="4088726371"/>
-      </p:ext>
-    </p:extLst>
-  </p:cSld>
-  <p:clrMapOvr>
-    <a:masterClrMapping/>
-  </p:clrMapOvr>
-  <mc:AlternateContent xmlns:mc="http://schemas.openxmlformats.org/markup-compatibility/2006" xmlns:p14="http://schemas.microsoft.com/office/powerpoint/2010/main">
-    <mc:Choice Requires="p14">
-      <p:transition spd="med" p14:dur="700">
-        <p:fade/>
-      </p:transition>
-    </mc:Choice>
-    <mc:Fallback xmlns="">
-      <p:transition spd="med">
-        <p:fade/>
-      </p:transition>
-    </mc:Fallback>
-  </mc:AlternateContent>
 </p:sld>
 </file>
 

</xml_diff>